<commit_message>
Fixed up the look of the presentation and errors in displays
</commit_message>
<xml_diff>
--- a/Presentation.pptx
+++ b/Presentation.pptx
@@ -5,8 +5,8 @@
     <p:sldMasterId id="2147483648" r:id="rId1"/>
   </p:sldMasterIdLst>
   <p:sldIdLst>
-    <p:sldId id="256" r:id="rId2"/>
-    <p:sldId id="257" r:id="rId3"/>
+    <p:sldId id="264" r:id="rId2"/>
+    <p:sldId id="256" r:id="rId3"/>
     <p:sldId id="258" r:id="rId4"/>
     <p:sldId id="259" r:id="rId5"/>
     <p:sldId id="260" r:id="rId6"/>
@@ -268,7 +268,7 @@
           <a:p>
             <a:fld id="{E384C852-89AA-4DE6-A898-D0F65D748CB0}" type="datetimeFigureOut">
               <a:rPr lang="en-CA" smtClean="0"/>
-              <a:t>2023-02-12</a:t>
+              <a:t>2023-02-13</a:t>
             </a:fld>
             <a:endParaRPr lang="en-CA"/>
           </a:p>
@@ -468,7 +468,7 @@
           <a:p>
             <a:fld id="{E384C852-89AA-4DE6-A898-D0F65D748CB0}" type="datetimeFigureOut">
               <a:rPr lang="en-CA" smtClean="0"/>
-              <a:t>2023-02-12</a:t>
+              <a:t>2023-02-13</a:t>
             </a:fld>
             <a:endParaRPr lang="en-CA"/>
           </a:p>
@@ -678,7 +678,7 @@
           <a:p>
             <a:fld id="{E384C852-89AA-4DE6-A898-D0F65D748CB0}" type="datetimeFigureOut">
               <a:rPr lang="en-CA" smtClean="0"/>
-              <a:t>2023-02-12</a:t>
+              <a:t>2023-02-13</a:t>
             </a:fld>
             <a:endParaRPr lang="en-CA"/>
           </a:p>
@@ -878,7 +878,7 @@
           <a:p>
             <a:fld id="{E384C852-89AA-4DE6-A898-D0F65D748CB0}" type="datetimeFigureOut">
               <a:rPr lang="en-CA" smtClean="0"/>
-              <a:t>2023-02-12</a:t>
+              <a:t>2023-02-13</a:t>
             </a:fld>
             <a:endParaRPr lang="en-CA"/>
           </a:p>
@@ -1154,7 +1154,7 @@
           <a:p>
             <a:fld id="{E384C852-89AA-4DE6-A898-D0F65D748CB0}" type="datetimeFigureOut">
               <a:rPr lang="en-CA" smtClean="0"/>
-              <a:t>2023-02-12</a:t>
+              <a:t>2023-02-13</a:t>
             </a:fld>
             <a:endParaRPr lang="en-CA"/>
           </a:p>
@@ -1422,7 +1422,7 @@
           <a:p>
             <a:fld id="{E384C852-89AA-4DE6-A898-D0F65D748CB0}" type="datetimeFigureOut">
               <a:rPr lang="en-CA" smtClean="0"/>
-              <a:t>2023-02-12</a:t>
+              <a:t>2023-02-13</a:t>
             </a:fld>
             <a:endParaRPr lang="en-CA"/>
           </a:p>
@@ -1837,7 +1837,7 @@
           <a:p>
             <a:fld id="{E384C852-89AA-4DE6-A898-D0F65D748CB0}" type="datetimeFigureOut">
               <a:rPr lang="en-CA" smtClean="0"/>
-              <a:t>2023-02-12</a:t>
+              <a:t>2023-02-13</a:t>
             </a:fld>
             <a:endParaRPr lang="en-CA"/>
           </a:p>
@@ -1979,7 +1979,7 @@
           <a:p>
             <a:fld id="{E384C852-89AA-4DE6-A898-D0F65D748CB0}" type="datetimeFigureOut">
               <a:rPr lang="en-CA" smtClean="0"/>
-              <a:t>2023-02-12</a:t>
+              <a:t>2023-02-13</a:t>
             </a:fld>
             <a:endParaRPr lang="en-CA"/>
           </a:p>
@@ -2092,7 +2092,7 @@
           <a:p>
             <a:fld id="{E384C852-89AA-4DE6-A898-D0F65D748CB0}" type="datetimeFigureOut">
               <a:rPr lang="en-CA" smtClean="0"/>
-              <a:t>2023-02-12</a:t>
+              <a:t>2023-02-13</a:t>
             </a:fld>
             <a:endParaRPr lang="en-CA"/>
           </a:p>
@@ -2405,7 +2405,7 @@
           <a:p>
             <a:fld id="{E384C852-89AA-4DE6-A898-D0F65D748CB0}" type="datetimeFigureOut">
               <a:rPr lang="en-CA" smtClean="0"/>
-              <a:t>2023-02-12</a:t>
+              <a:t>2023-02-13</a:t>
             </a:fld>
             <a:endParaRPr lang="en-CA"/>
           </a:p>
@@ -2694,7 +2694,7 @@
           <a:p>
             <a:fld id="{E384C852-89AA-4DE6-A898-D0F65D748CB0}" type="datetimeFigureOut">
               <a:rPr lang="en-CA" smtClean="0"/>
-              <a:t>2023-02-12</a:t>
+              <a:t>2023-02-13</a:t>
             </a:fld>
             <a:endParaRPr lang="en-CA"/>
           </a:p>
@@ -2937,7 +2937,7 @@
           <a:p>
             <a:fld id="{E384C852-89AA-4DE6-A898-D0F65D748CB0}" type="datetimeFigureOut">
               <a:rPr lang="en-CA" smtClean="0"/>
-              <a:t>2023-02-12</a:t>
+              <a:t>2023-02-13</a:t>
             </a:fld>
             <a:endParaRPr lang="en-CA"/>
           </a:p>
@@ -3354,78 +3354,74 @@
           <a:chExt cx="0" cy="0"/>
         </a:xfrm>
       </p:grpSpPr>
-      <p:pic>
-        <p:nvPicPr>
-          <p:cNvPr id="5" name="Picture 4">
-            <a:extLst>
-              <a:ext uri="{FF2B5EF4-FFF2-40B4-BE49-F238E27FC236}">
-                <a16:creationId xmlns:a16="http://schemas.microsoft.com/office/drawing/2014/main" id="{D853BAD9-2DA5-3C80-14D2-BFB91791B92E}"/>
-              </a:ext>
-            </a:extLst>
-          </p:cNvPr>
-          <p:cNvPicPr>
-            <a:picLocks noChangeAspect="1"/>
-          </p:cNvPicPr>
-          <p:nvPr/>
-        </p:nvPicPr>
-        <p:blipFill>
-          <a:blip r:embed="rId2">
-            <a:extLst>
-              <a:ext uri="{28A0092B-C50C-407E-A947-70E740481C1C}">
-                <a14:useLocalDpi xmlns:a14="http://schemas.microsoft.com/office/drawing/2010/main" val="0"/>
-              </a:ext>
-            </a:extLst>
-          </a:blip>
-          <a:srcRect/>
-          <a:stretch/>
-        </p:blipFill>
-        <p:spPr>
-          <a:xfrm>
-            <a:off x="2348980" y="1629000"/>
-            <a:ext cx="7494039" cy="3600000"/>
-          </a:xfrm>
-          <a:prstGeom prst="rect">
-            <a:avLst/>
-          </a:prstGeom>
-        </p:spPr>
-      </p:pic>
-      <p:sp>
-        <p:nvSpPr>
-          <p:cNvPr id="6" name="TextBox 5">
-            <a:extLst>
-              <a:ext uri="{FF2B5EF4-FFF2-40B4-BE49-F238E27FC236}">
-                <a16:creationId xmlns:a16="http://schemas.microsoft.com/office/drawing/2014/main" id="{C5A8C9C6-AAA1-26C7-A93B-6265ABB9BCA0}"/>
-              </a:ext>
-            </a:extLst>
-          </p:cNvPr>
-          <p:cNvSpPr txBox="1"/>
-          <p:nvPr/>
-        </p:nvSpPr>
-        <p:spPr>
-          <a:xfrm>
-            <a:off x="186620" y="186620"/>
-            <a:ext cx="8472196" cy="369332"/>
-          </a:xfrm>
-          <a:prstGeom prst="rect">
-            <a:avLst/>
-          </a:prstGeom>
-          <a:noFill/>
-        </p:spPr>
-        <p:txBody>
-          <a:bodyPr wrap="square" rtlCol="0">
-            <a:spAutoFit/>
+      <p:sp>
+        <p:nvSpPr>
+          <p:cNvPr id="2" name="Title 1">
+            <a:extLst>
+              <a:ext uri="{FF2B5EF4-FFF2-40B4-BE49-F238E27FC236}">
+                <a16:creationId xmlns:a16="http://schemas.microsoft.com/office/drawing/2014/main" id="{3B103533-47DE-F873-21FB-BE4AE6285420}"/>
+              </a:ext>
+            </a:extLst>
+          </p:cNvPr>
+          <p:cNvSpPr>
+            <a:spLocks noGrp="1"/>
+          </p:cNvSpPr>
+          <p:nvPr>
+            <p:ph type="title"/>
+          </p:nvPr>
+        </p:nvSpPr>
+        <p:spPr/>
+        <p:txBody>
+          <a:bodyPr>
+            <a:normAutofit fontScale="90000"/>
           </a:bodyPr>
           <a:lstStyle/>
           <a:p>
-            <a:r>
-              <a:rPr lang="en-CA" sz="1800" dirty="0">
+            <a:pPr algn="ctr"/>
+            <a:r>
+              <a:rPr lang="en-CA" dirty="0"/>
+              <a:t>Stock Market Questions about a 10 Year Period from </a:t>
+            </a:r>
+            <a:r>
+              <a:rPr lang="en-CA" b="0" dirty="0">
                 <a:effectLst/>
-                <a:latin typeface="Calibri" panose="020F0502020204030204" pitchFamily="34" charset="0"/>
-                <a:ea typeface="Calibri" panose="020F0502020204030204" pitchFamily="34" charset="0"/>
-                <a:cs typeface="Times New Roman" panose="02020603050405020304" pitchFamily="18" charset="0"/>
               </a:rPr>
-              <a:t>Stock markets performance over a 10 year period.</a:t>
-            </a:r>
+              <a:t>2012-01-01 to 2022-01-01.</a:t>
+            </a:r>
+            <a:br>
+              <a:rPr lang="en-CA" b="0" dirty="0">
+                <a:solidFill>
+                  <a:srgbClr val="D4D4D4"/>
+                </a:solidFill>
+                <a:effectLst/>
+                <a:latin typeface="Consolas" panose="020B0609020204030204" pitchFamily="49" charset="0"/>
+              </a:rPr>
+            </a:br>
+            <a:endParaRPr lang="en-CA" dirty="0"/>
+          </a:p>
+        </p:txBody>
+      </p:sp>
+      <p:sp>
+        <p:nvSpPr>
+          <p:cNvPr id="3" name="Content Placeholder 2">
+            <a:extLst>
+              <a:ext uri="{FF2B5EF4-FFF2-40B4-BE49-F238E27FC236}">
+                <a16:creationId xmlns:a16="http://schemas.microsoft.com/office/drawing/2014/main" id="{4C0F9C27-48D2-8715-EB5E-03992B93A39C}"/>
+              </a:ext>
+            </a:extLst>
+          </p:cNvPr>
+          <p:cNvSpPr>
+            <a:spLocks noGrp="1"/>
+          </p:cNvSpPr>
+          <p:nvPr>
+            <p:ph idx="1"/>
+          </p:nvPr>
+        </p:nvSpPr>
+        <p:spPr/>
+        <p:txBody>
+          <a:bodyPr/>
+          <a:lstStyle/>
+          <a:p>
             <a:endParaRPr lang="en-CA" dirty="0"/>
           </a:p>
         </p:txBody>
@@ -3433,7 +3429,7 @@
     </p:spTree>
     <p:extLst>
       <p:ext uri="{BB962C8B-B14F-4D97-AF65-F5344CB8AC3E}">
-        <p14:creationId xmlns:p14="http://schemas.microsoft.com/office/powerpoint/2010/main" val="3864365155"/>
+        <p14:creationId xmlns:p14="http://schemas.microsoft.com/office/powerpoint/2010/main" val="2164889791"/>
       </p:ext>
     </p:extLst>
   </p:cSld>
@@ -3460,12 +3456,64 @@
           <a:chExt cx="0" cy="0"/>
         </a:xfrm>
       </p:grpSpPr>
+      <p:sp>
+        <p:nvSpPr>
+          <p:cNvPr id="6" name="TextBox 5">
+            <a:extLst>
+              <a:ext uri="{FF2B5EF4-FFF2-40B4-BE49-F238E27FC236}">
+                <a16:creationId xmlns:a16="http://schemas.microsoft.com/office/drawing/2014/main" id="{C5A8C9C6-AAA1-26C7-A93B-6265ABB9BCA0}"/>
+              </a:ext>
+            </a:extLst>
+          </p:cNvPr>
+          <p:cNvSpPr txBox="1"/>
+          <p:nvPr/>
+        </p:nvSpPr>
+        <p:spPr>
+          <a:xfrm>
+            <a:off x="186620" y="186620"/>
+            <a:ext cx="11414830" cy="830997"/>
+          </a:xfrm>
+          <a:prstGeom prst="rect">
+            <a:avLst/>
+          </a:prstGeom>
+          <a:noFill/>
+        </p:spPr>
+        <p:txBody>
+          <a:bodyPr wrap="square" rtlCol="0">
+            <a:spAutoFit/>
+          </a:bodyPr>
+          <a:lstStyle/>
+          <a:p>
+            <a:r>
+              <a:rPr lang="en-CA" sz="2400" dirty="0">
+                <a:effectLst/>
+                <a:latin typeface="Calibri" panose="020F0502020204030204" pitchFamily="34" charset="0"/>
+                <a:ea typeface="Calibri" panose="020F0502020204030204" pitchFamily="34" charset="0"/>
+                <a:cs typeface="Times New Roman" panose="02020603050405020304" pitchFamily="18" charset="0"/>
+              </a:rPr>
+              <a:t>Stock Market performance over a 10 year period: SPY vs QQQ vs VTI. </a:t>
+            </a:r>
+          </a:p>
+          <a:p>
+            <a:r>
+              <a:rPr lang="en-CA" sz="2400" dirty="0">
+                <a:effectLst/>
+                <a:latin typeface="Calibri" panose="020F0502020204030204" pitchFamily="34" charset="0"/>
+                <a:ea typeface="Calibri" panose="020F0502020204030204" pitchFamily="34" charset="0"/>
+                <a:cs typeface="Times New Roman" panose="02020603050405020304" pitchFamily="18" charset="0"/>
+              </a:rPr>
+              <a:t>3 Most Popular ETFs representing the US Stock Market:</a:t>
+            </a:r>
+            <a:endParaRPr lang="en-CA" sz="2400" dirty="0"/>
+          </a:p>
+        </p:txBody>
+      </p:sp>
       <p:pic>
         <p:nvPicPr>
-          <p:cNvPr id="4" name="Picture 3">
-            <a:extLst>
-              <a:ext uri="{FF2B5EF4-FFF2-40B4-BE49-F238E27FC236}">
-                <a16:creationId xmlns:a16="http://schemas.microsoft.com/office/drawing/2014/main" id="{89D0C688-FD1E-1AC3-FE4B-CBA74056762B}"/>
+          <p:cNvPr id="7" name="Picture 6">
+            <a:extLst>
+              <a:ext uri="{FF2B5EF4-FFF2-40B4-BE49-F238E27FC236}">
+                <a16:creationId xmlns:a16="http://schemas.microsoft.com/office/drawing/2014/main" id="{34901788-869E-6299-78A2-F75180478428}"/>
               </a:ext>
             </a:extLst>
           </p:cNvPr>
@@ -3475,7 +3523,37 @@
           <p:nvPr/>
         </p:nvPicPr>
         <p:blipFill>
-          <a:blip r:embed="rId2">
+          <a:blip r:embed="rId2"/>
+          <a:stretch>
+            <a:fillRect/>
+          </a:stretch>
+        </p:blipFill>
+        <p:spPr>
+          <a:xfrm>
+            <a:off x="99941" y="1997764"/>
+            <a:ext cx="5704513" cy="4442792"/>
+          </a:xfrm>
+          <a:prstGeom prst="rect">
+            <a:avLst/>
+          </a:prstGeom>
+        </p:spPr>
+      </p:pic>
+      <p:pic>
+        <p:nvPicPr>
+          <p:cNvPr id="8" name="Picture 7">
+            <a:extLst>
+              <a:ext uri="{FF2B5EF4-FFF2-40B4-BE49-F238E27FC236}">
+                <a16:creationId xmlns:a16="http://schemas.microsoft.com/office/drawing/2014/main" id="{07E2E10C-E838-BAA4-178A-5FFF68FCA94C}"/>
+              </a:ext>
+            </a:extLst>
+          </p:cNvPr>
+          <p:cNvPicPr>
+            <a:picLocks noChangeAspect="1"/>
+          </p:cNvPicPr>
+          <p:nvPr/>
+        </p:nvPicPr>
+        <p:blipFill>
+          <a:blip r:embed="rId3">
             <a:extLst>
               <a:ext uri="{28A0092B-C50C-407E-A947-70E740481C1C}">
                 <a14:useLocalDpi xmlns:a14="http://schemas.microsoft.com/office/drawing/2010/main" val="0"/>
@@ -3487,8 +3565,8 @@
         </p:blipFill>
         <p:spPr>
           <a:xfrm>
-            <a:off x="2348980" y="1629000"/>
-            <a:ext cx="7494039" cy="3600000"/>
+            <a:off x="6911422" y="1997765"/>
+            <a:ext cx="5704513" cy="4442791"/>
           </a:xfrm>
           <a:prstGeom prst="rect">
             <a:avLst/>
@@ -3497,10 +3575,194 @@
       </p:pic>
       <p:sp>
         <p:nvSpPr>
-          <p:cNvPr id="5" name="TextBox 4">
-            <a:extLst>
-              <a:ext uri="{FF2B5EF4-FFF2-40B4-BE49-F238E27FC236}">
-                <a16:creationId xmlns:a16="http://schemas.microsoft.com/office/drawing/2014/main" id="{050CA17F-2997-6B32-CF9F-9F68CA194476}"/>
+          <p:cNvPr id="12" name="Arrow: Right 11">
+            <a:extLst>
+              <a:ext uri="{FF2B5EF4-FFF2-40B4-BE49-F238E27FC236}">
+                <a16:creationId xmlns:a16="http://schemas.microsoft.com/office/drawing/2014/main" id="{AB688FD4-6A70-2B2E-C04B-D81185C1F3B8}"/>
+              </a:ext>
+            </a:extLst>
+          </p:cNvPr>
+          <p:cNvSpPr/>
+          <p:nvPr/>
+        </p:nvSpPr>
+        <p:spPr>
+          <a:xfrm>
+            <a:off x="4337604" y="2961722"/>
+            <a:ext cx="1885950" cy="646331"/>
+          </a:xfrm>
+          <a:prstGeom prst="rightArrow">
+            <a:avLst/>
+          </a:prstGeom>
+        </p:spPr>
+        <p:style>
+          <a:lnRef idx="2">
+            <a:schemeClr val="accent1">
+              <a:shade val="50000"/>
+            </a:schemeClr>
+          </a:lnRef>
+          <a:fillRef idx="1">
+            <a:schemeClr val="accent1"/>
+          </a:fillRef>
+          <a:effectRef idx="0">
+            <a:schemeClr val="accent1"/>
+          </a:effectRef>
+          <a:fontRef idx="minor">
+            <a:schemeClr val="lt1"/>
+          </a:fontRef>
+        </p:style>
+        <p:txBody>
+          <a:bodyPr rtlCol="0" anchor="ctr"/>
+          <a:lstStyle/>
+          <a:p>
+            <a:pPr algn="ctr"/>
+            <a:endParaRPr lang="en-CA"/>
+          </a:p>
+        </p:txBody>
+      </p:sp>
+      <p:sp>
+        <p:nvSpPr>
+          <p:cNvPr id="13" name="Arrow: Right 12">
+            <a:extLst>
+              <a:ext uri="{FF2B5EF4-FFF2-40B4-BE49-F238E27FC236}">
+                <a16:creationId xmlns:a16="http://schemas.microsoft.com/office/drawing/2014/main" id="{D84CB82A-A4F1-1041-BB53-656E223ACFDC}"/>
+              </a:ext>
+            </a:extLst>
+          </p:cNvPr>
+          <p:cNvSpPr/>
+          <p:nvPr/>
+        </p:nvSpPr>
+        <p:spPr>
+          <a:xfrm>
+            <a:off x="4337604" y="4513625"/>
+            <a:ext cx="1885950" cy="646331"/>
+          </a:xfrm>
+          <a:prstGeom prst="rightArrow">
+            <a:avLst/>
+          </a:prstGeom>
+        </p:spPr>
+        <p:style>
+          <a:lnRef idx="2">
+            <a:schemeClr val="accent1">
+              <a:shade val="50000"/>
+            </a:schemeClr>
+          </a:lnRef>
+          <a:fillRef idx="1">
+            <a:schemeClr val="accent1"/>
+          </a:fillRef>
+          <a:effectRef idx="0">
+            <a:schemeClr val="accent1"/>
+          </a:effectRef>
+          <a:fontRef idx="minor">
+            <a:schemeClr val="lt1"/>
+          </a:fontRef>
+        </p:style>
+        <p:txBody>
+          <a:bodyPr rtlCol="0" anchor="ctr"/>
+          <a:lstStyle/>
+          <a:p>
+            <a:pPr algn="ctr"/>
+            <a:endParaRPr lang="en-CA"/>
+          </a:p>
+        </p:txBody>
+      </p:sp>
+      <p:sp>
+        <p:nvSpPr>
+          <p:cNvPr id="14" name="Arrow: Right 13">
+            <a:extLst>
+              <a:ext uri="{FF2B5EF4-FFF2-40B4-BE49-F238E27FC236}">
+                <a16:creationId xmlns:a16="http://schemas.microsoft.com/office/drawing/2014/main" id="{039A78CC-FE99-7A0B-A0B0-BDE2BB0060E9}"/>
+              </a:ext>
+            </a:extLst>
+          </p:cNvPr>
+          <p:cNvSpPr/>
+          <p:nvPr/>
+        </p:nvSpPr>
+        <p:spPr>
+          <a:xfrm>
+            <a:off x="4329113" y="5315508"/>
+            <a:ext cx="1885950" cy="646331"/>
+          </a:xfrm>
+          <a:prstGeom prst="rightArrow">
+            <a:avLst/>
+          </a:prstGeom>
+        </p:spPr>
+        <p:style>
+          <a:lnRef idx="2">
+            <a:schemeClr val="accent1">
+              <a:shade val="50000"/>
+            </a:schemeClr>
+          </a:lnRef>
+          <a:fillRef idx="1">
+            <a:schemeClr val="accent1"/>
+          </a:fillRef>
+          <a:effectRef idx="0">
+            <a:schemeClr val="accent1"/>
+          </a:effectRef>
+          <a:fontRef idx="minor">
+            <a:schemeClr val="lt1"/>
+          </a:fontRef>
+        </p:style>
+        <p:txBody>
+          <a:bodyPr rtlCol="0" anchor="ctr"/>
+          <a:lstStyle/>
+          <a:p>
+            <a:pPr algn="ctr"/>
+            <a:endParaRPr lang="en-CA"/>
+          </a:p>
+        </p:txBody>
+      </p:sp>
+      <p:sp>
+        <p:nvSpPr>
+          <p:cNvPr id="15" name="Arrow: Right 14">
+            <a:extLst>
+              <a:ext uri="{FF2B5EF4-FFF2-40B4-BE49-F238E27FC236}">
+                <a16:creationId xmlns:a16="http://schemas.microsoft.com/office/drawing/2014/main" id="{6FA8917D-7DC2-D887-C0C2-D4562742CF17}"/>
+              </a:ext>
+            </a:extLst>
+          </p:cNvPr>
+          <p:cNvSpPr/>
+          <p:nvPr/>
+        </p:nvSpPr>
+        <p:spPr>
+          <a:xfrm>
+            <a:off x="4314826" y="2156578"/>
+            <a:ext cx="1885950" cy="646331"/>
+          </a:xfrm>
+          <a:prstGeom prst="rightArrow">
+            <a:avLst/>
+          </a:prstGeom>
+        </p:spPr>
+        <p:style>
+          <a:lnRef idx="2">
+            <a:schemeClr val="accent1">
+              <a:shade val="50000"/>
+            </a:schemeClr>
+          </a:lnRef>
+          <a:fillRef idx="1">
+            <a:schemeClr val="accent1"/>
+          </a:fillRef>
+          <a:effectRef idx="0">
+            <a:schemeClr val="accent1"/>
+          </a:effectRef>
+          <a:fontRef idx="minor">
+            <a:schemeClr val="lt1"/>
+          </a:fontRef>
+        </p:style>
+        <p:txBody>
+          <a:bodyPr rtlCol="0" anchor="ctr"/>
+          <a:lstStyle/>
+          <a:p>
+            <a:pPr algn="ctr"/>
+            <a:endParaRPr lang="en-CA"/>
+          </a:p>
+        </p:txBody>
+      </p:sp>
+      <p:sp>
+        <p:nvSpPr>
+          <p:cNvPr id="16" name="TextBox 15">
+            <a:extLst>
+              <a:ext uri="{FF2B5EF4-FFF2-40B4-BE49-F238E27FC236}">
+                <a16:creationId xmlns:a16="http://schemas.microsoft.com/office/drawing/2014/main" id="{40586851-74BD-5BB9-A18A-C6415257D086}"/>
               </a:ext>
             </a:extLst>
           </p:cNvPr>
@@ -3509,8 +3771,8 @@
         </p:nvSpPr>
         <p:spPr>
           <a:xfrm>
-            <a:off x="186620" y="186620"/>
-            <a:ext cx="8472196" cy="369332"/>
+            <a:off x="4143376" y="1230691"/>
+            <a:ext cx="2228850" cy="369332"/>
           </a:xfrm>
           <a:prstGeom prst="rect">
             <a:avLst/>
@@ -3524,22 +3786,16 @@
           <a:lstStyle/>
           <a:p>
             <a:r>
-              <a:rPr lang="en-CA" sz="1800" dirty="0">
-                <a:effectLst/>
-                <a:latin typeface="Calibri" panose="020F0502020204030204" pitchFamily="34" charset="0"/>
-                <a:ea typeface="Calibri" panose="020F0502020204030204" pitchFamily="34" charset="0"/>
-                <a:cs typeface="Times New Roman" panose="02020603050405020304" pitchFamily="18" charset="0"/>
-              </a:rPr>
-              <a:t>3 Most popular ETF.</a:t>
-            </a:r>
-            <a:endParaRPr lang="en-CA" dirty="0"/>
+              <a:rPr lang="en-CA" dirty="0"/>
+              <a:t>After Standardization:</a:t>
+            </a:r>
           </a:p>
         </p:txBody>
       </p:sp>
     </p:spTree>
     <p:extLst>
       <p:ext uri="{BB962C8B-B14F-4D97-AF65-F5344CB8AC3E}">
-        <p14:creationId xmlns:p14="http://schemas.microsoft.com/office/powerpoint/2010/main" val="19789646"/>
+        <p14:creationId xmlns:p14="http://schemas.microsoft.com/office/powerpoint/2010/main" val="3864365155"/>
       </p:ext>
     </p:extLst>
   </p:cSld>
@@ -3588,8 +3844,8 @@
         </p:blipFill>
         <p:spPr>
           <a:xfrm>
-            <a:off x="1522710" y="1629000"/>
-            <a:ext cx="9146580" cy="3600000"/>
+            <a:off x="191119" y="971549"/>
+            <a:ext cx="11881789" cy="5800725"/>
           </a:xfrm>
           <a:prstGeom prst="rect">
             <a:avLst/>
@@ -3611,7 +3867,7 @@
         <p:spPr>
           <a:xfrm>
             <a:off x="186620" y="186620"/>
-            <a:ext cx="8472196" cy="369332"/>
+            <a:ext cx="8472196" cy="646331"/>
           </a:xfrm>
           <a:prstGeom prst="rect">
             <a:avLst/>
@@ -3631,7 +3887,7 @@
                 <a:ea typeface="Calibri" panose="020F0502020204030204" pitchFamily="34" charset="0"/>
                 <a:cs typeface="Times New Roman" panose="02020603050405020304" pitchFamily="18" charset="0"/>
               </a:rPr>
-              <a:t>Performance of all of the indexes over 10 years. </a:t>
+              <a:t>Then we added in the other Indexes represented by ETFs and their performance over the last 10 years:</a:t>
             </a:r>
             <a:endParaRPr lang="en-CA" dirty="0"/>
           </a:p>
@@ -3682,14 +3938,14 @@
           <p:nvPr>
             <p:extLst>
               <p:ext uri="{D42A27DB-BD31-4B8C-83A1-F6EECF244321}">
-                <p14:modId xmlns:p14="http://schemas.microsoft.com/office/powerpoint/2010/main" val="3350436400"/>
+                <p14:modId xmlns:p14="http://schemas.microsoft.com/office/powerpoint/2010/main" val="4096347072"/>
               </p:ext>
             </p:extLst>
           </p:nvPr>
         </p:nvGraphicFramePr>
         <p:xfrm>
-          <a:off x="2126343" y="1179000"/>
-          <a:ext cx="7939315" cy="4500000"/>
+          <a:off x="819151" y="790575"/>
+          <a:ext cx="10429875" cy="5688653"/>
         </p:xfrm>
         <a:graphic>
           <a:graphicData uri="http://schemas.openxmlformats.org/drawingml/2006/table">
@@ -3698,35 +3954,35 @@
                 <a:tableStyleId>{5C22544A-7EE6-4342-B048-85BDC9FD1C3A}</a:tableStyleId>
               </a:tblPr>
               <a:tblGrid>
-                <a:gridCol w="1587863">
+                <a:gridCol w="2085975">
                   <a:extLst>
                     <a:ext uri="{9D8B030D-6E8A-4147-A177-3AD203B41FA5}">
                       <a16:colId xmlns:a16="http://schemas.microsoft.com/office/drawing/2014/main" val="453883277"/>
                     </a:ext>
                   </a:extLst>
                 </a:gridCol>
-                <a:gridCol w="1587863">
+                <a:gridCol w="2085975">
                   <a:extLst>
                     <a:ext uri="{9D8B030D-6E8A-4147-A177-3AD203B41FA5}">
                       <a16:colId xmlns:a16="http://schemas.microsoft.com/office/drawing/2014/main" val="2605497063"/>
                     </a:ext>
                   </a:extLst>
                 </a:gridCol>
-                <a:gridCol w="1587863">
+                <a:gridCol w="2085975">
                   <a:extLst>
                     <a:ext uri="{9D8B030D-6E8A-4147-A177-3AD203B41FA5}">
                       <a16:colId xmlns:a16="http://schemas.microsoft.com/office/drawing/2014/main" val="2889380415"/>
                     </a:ext>
                   </a:extLst>
                 </a:gridCol>
-                <a:gridCol w="1587863">
+                <a:gridCol w="2085975">
                   <a:extLst>
                     <a:ext uri="{9D8B030D-6E8A-4147-A177-3AD203B41FA5}">
                       <a16:colId xmlns:a16="http://schemas.microsoft.com/office/drawing/2014/main" val="1921688564"/>
                     </a:ext>
                   </a:extLst>
                 </a:gridCol>
-                <a:gridCol w="1587863">
+                <a:gridCol w="2085975">
                   <a:extLst>
                     <a:ext uri="{9D8B030D-6E8A-4147-A177-3AD203B41FA5}">
                       <a16:colId xmlns:a16="http://schemas.microsoft.com/office/drawing/2014/main" val="1159262708"/>
@@ -3734,7 +3990,7 @@
                   </a:extLst>
                 </a:gridCol>
               </a:tblGrid>
-              <a:tr h="375000">
+              <a:tr h="465138">
                 <a:tc>
                   <a:txBody>
                     <a:bodyPr/>
@@ -3748,15 +4004,12 @@
                           <a:spcPts val="800"/>
                         </a:spcAft>
                       </a:pPr>
-                      <a:r>
-                        <a:rPr lang="en-CA" sz="1100" dirty="0">
-                          <a:effectLst/>
-                          <a:latin typeface="Calibri" panose="020F0502020204030204" pitchFamily="34" charset="0"/>
-                          <a:ea typeface="Calibri" panose="020F0502020204030204" pitchFamily="34" charset="0"/>
-                          <a:cs typeface="Times New Roman" panose="02020603050405020304" pitchFamily="18" charset="0"/>
-                        </a:rPr>
-                        <a:t> </a:t>
-                      </a:r>
+                      <a:endParaRPr lang="en-CA" sz="1100" dirty="0">
+                        <a:effectLst/>
+                        <a:latin typeface="Calibri" panose="020F0502020204030204" pitchFamily="34" charset="0"/>
+                        <a:ea typeface="Calibri" panose="020F0502020204030204" pitchFamily="34" charset="0"/>
+                        <a:cs typeface="Times New Roman" panose="02020603050405020304" pitchFamily="18" charset="0"/>
+                      </a:endParaRPr>
                     </a:p>
                   </a:txBody>
                   <a:tcPr marL="68580" marR="68580" marT="0" marB="0" anchor="ctr">
@@ -3777,7 +4030,7 @@
                         </a:spcAft>
                       </a:pPr>
                       <a:r>
-                        <a:rPr lang="en-CA" sz="600" b="1" dirty="0">
+                        <a:rPr lang="en-CA" sz="1800" b="1" dirty="0">
                           <a:effectLst/>
                           <a:latin typeface="Segoe UI" panose="020B0502040204020203" pitchFamily="34" charset="0"/>
                           <a:ea typeface="Calibri" panose="020F0502020204030204" pitchFamily="34" charset="0"/>
@@ -3785,7 +4038,7 @@
                         </a:rPr>
                         <a:t>10 Year Yearly Rate of Return</a:t>
                       </a:r>
-                      <a:endParaRPr lang="en-CA" sz="1100" dirty="0">
+                      <a:endParaRPr lang="en-CA" sz="1800" dirty="0">
                         <a:effectLst/>
                         <a:latin typeface="Calibri" panose="020F0502020204030204" pitchFamily="34" charset="0"/>
                         <a:ea typeface="Calibri" panose="020F0502020204030204" pitchFamily="34" charset="0"/>
@@ -3813,7 +4066,7 @@
                         </a:spcAft>
                       </a:pPr>
                       <a:r>
-                        <a:rPr lang="en-CA" sz="600" b="1" dirty="0">
+                        <a:rPr lang="en-CA" sz="1800" b="1" dirty="0">
                           <a:effectLst/>
                           <a:latin typeface="Segoe UI" panose="020B0502040204020203" pitchFamily="34" charset="0"/>
                           <a:ea typeface="Calibri" panose="020F0502020204030204" pitchFamily="34" charset="0"/>
@@ -3821,7 +4074,7 @@
                         </a:rPr>
                         <a:t>5 Year Yearly Rate of Return</a:t>
                       </a:r>
-                      <a:endParaRPr lang="en-CA" sz="1100" dirty="0">
+                      <a:endParaRPr lang="en-CA" sz="1800" dirty="0">
                         <a:effectLst/>
                         <a:latin typeface="Calibri" panose="020F0502020204030204" pitchFamily="34" charset="0"/>
                         <a:ea typeface="Calibri" panose="020F0502020204030204" pitchFamily="34" charset="0"/>
@@ -3849,7 +4102,7 @@
                         </a:spcAft>
                       </a:pPr>
                       <a:r>
-                        <a:rPr lang="en-CA" sz="600" b="1" dirty="0">
+                        <a:rPr lang="en-CA" sz="1800" b="1" dirty="0">
                           <a:effectLst/>
                           <a:latin typeface="Segoe UI" panose="020B0502040204020203" pitchFamily="34" charset="0"/>
                           <a:ea typeface="Calibri" panose="020F0502020204030204" pitchFamily="34" charset="0"/>
@@ -3857,7 +4110,7 @@
                         </a:rPr>
                         <a:t>3 Year Yearly Rate of Return</a:t>
                       </a:r>
-                      <a:endParaRPr lang="en-CA" sz="1100" dirty="0">
+                      <a:endParaRPr lang="en-CA" sz="1800" dirty="0">
                         <a:effectLst/>
                         <a:latin typeface="Calibri" panose="020F0502020204030204" pitchFamily="34" charset="0"/>
                         <a:ea typeface="Calibri" panose="020F0502020204030204" pitchFamily="34" charset="0"/>
@@ -3885,7 +4138,7 @@
                         </a:spcAft>
                       </a:pPr>
                       <a:r>
-                        <a:rPr lang="en-CA" sz="600" b="1" dirty="0">
+                        <a:rPr lang="en-CA" sz="1800" b="1" dirty="0">
                           <a:effectLst/>
                           <a:latin typeface="Segoe UI" panose="020B0502040204020203" pitchFamily="34" charset="0"/>
                           <a:ea typeface="Calibri" panose="020F0502020204030204" pitchFamily="34" charset="0"/>
@@ -3893,7 +4146,7 @@
                         </a:rPr>
                         <a:t>1 Year Yearly Rate of Return</a:t>
                       </a:r>
-                      <a:endParaRPr lang="en-CA" sz="1100" dirty="0">
+                      <a:endParaRPr lang="en-CA" sz="1800" dirty="0">
                         <a:effectLst/>
                         <a:latin typeface="Calibri" panose="020F0502020204030204" pitchFamily="34" charset="0"/>
                         <a:ea typeface="Calibri" panose="020F0502020204030204" pitchFamily="34" charset="0"/>
@@ -3913,7 +4166,7 @@
                   </a:ext>
                 </a:extLst>
               </a:tr>
-              <a:tr h="375000">
+              <a:tr h="465138">
                 <a:tc>
                   <a:txBody>
                     <a:bodyPr/>
@@ -3928,7 +4181,7 @@
                         </a:spcAft>
                       </a:pPr>
                       <a:r>
-                        <a:rPr lang="en-CA" sz="600" dirty="0">
+                        <a:rPr lang="en-CA" sz="1800" dirty="0">
                           <a:effectLst/>
                           <a:latin typeface="Segoe UI" panose="020B0502040204020203" pitchFamily="34" charset="0"/>
                           <a:ea typeface="Calibri" panose="020F0502020204030204" pitchFamily="34" charset="0"/>
@@ -3936,7 +4189,7 @@
                         </a:rPr>
                         <a:t>SPY</a:t>
                       </a:r>
-                      <a:endParaRPr lang="en-CA" sz="1100" dirty="0">
+                      <a:endParaRPr lang="en-CA" sz="1800" dirty="0">
                         <a:effectLst/>
                         <a:latin typeface="Calibri" panose="020F0502020204030204" pitchFamily="34" charset="0"/>
                         <a:ea typeface="Calibri" panose="020F0502020204030204" pitchFamily="34" charset="0"/>
@@ -3964,7 +4217,7 @@
                         </a:spcAft>
                       </a:pPr>
                       <a:r>
-                        <a:rPr lang="en-CA" sz="600">
+                        <a:rPr lang="en-CA" sz="1800">
                           <a:effectLst/>
                           <a:latin typeface="Segoe UI" panose="020B0502040204020203" pitchFamily="34" charset="0"/>
                           <a:ea typeface="Calibri" panose="020F0502020204030204" pitchFamily="34" charset="0"/>
@@ -3972,7 +4225,7 @@
                         </a:rPr>
                         <a:t>27.251764</a:t>
                       </a:r>
-                      <a:endParaRPr lang="en-CA" sz="1100">
+                      <a:endParaRPr lang="en-CA" sz="1800">
                         <a:effectLst/>
                         <a:latin typeface="Calibri" panose="020F0502020204030204" pitchFamily="34" charset="0"/>
                         <a:ea typeface="Calibri" panose="020F0502020204030204" pitchFamily="34" charset="0"/>
@@ -4000,7 +4253,7 @@
                         </a:spcAft>
                       </a:pPr>
                       <a:r>
-                        <a:rPr lang="en-CA" sz="600" dirty="0">
+                        <a:rPr lang="en-CA" sz="1800" dirty="0">
                           <a:effectLst/>
                           <a:latin typeface="Segoe UI" panose="020B0502040204020203" pitchFamily="34" charset="0"/>
                           <a:ea typeface="Calibri" panose="020F0502020204030204" pitchFamily="34" charset="0"/>
@@ -4008,7 +4261,7 @@
                         </a:rPr>
                         <a:t>22.496309</a:t>
                       </a:r>
-                      <a:endParaRPr lang="en-CA" sz="1100" dirty="0">
+                      <a:endParaRPr lang="en-CA" sz="1800" dirty="0">
                         <a:effectLst/>
                         <a:latin typeface="Calibri" panose="020F0502020204030204" pitchFamily="34" charset="0"/>
                         <a:ea typeface="Calibri" panose="020F0502020204030204" pitchFamily="34" charset="0"/>
@@ -4036,7 +4289,7 @@
                         </a:spcAft>
                       </a:pPr>
                       <a:r>
-                        <a:rPr lang="en-CA" sz="600" dirty="0">
+                        <a:rPr lang="en-CA" sz="1800" dirty="0">
                           <a:effectLst/>
                           <a:latin typeface="Segoe UI" panose="020B0502040204020203" pitchFamily="34" charset="0"/>
                           <a:ea typeface="Calibri" panose="020F0502020204030204" pitchFamily="34" charset="0"/>
@@ -4044,7 +4297,7 @@
                         </a:rPr>
                         <a:t>31.496114</a:t>
                       </a:r>
-                      <a:endParaRPr lang="en-CA" sz="1100" dirty="0">
+                      <a:endParaRPr lang="en-CA" sz="1800" dirty="0">
                         <a:effectLst/>
                         <a:latin typeface="Calibri" panose="020F0502020204030204" pitchFamily="34" charset="0"/>
                         <a:ea typeface="Calibri" panose="020F0502020204030204" pitchFamily="34" charset="0"/>
@@ -4072,7 +4325,7 @@
                         </a:spcAft>
                       </a:pPr>
                       <a:r>
-                        <a:rPr lang="en-CA" sz="600" dirty="0">
+                        <a:rPr lang="en-CA" sz="1800" dirty="0">
                           <a:effectLst/>
                           <a:latin typeface="Segoe UI" panose="020B0502040204020203" pitchFamily="34" charset="0"/>
                           <a:ea typeface="Calibri" panose="020F0502020204030204" pitchFamily="34" charset="0"/>
@@ -4080,7 +4333,7 @@
                         </a:rPr>
                         <a:t>28.788736</a:t>
                       </a:r>
-                      <a:endParaRPr lang="en-CA" sz="1100" dirty="0">
+                      <a:endParaRPr lang="en-CA" sz="1800" dirty="0">
                         <a:effectLst/>
                         <a:latin typeface="Calibri" panose="020F0502020204030204" pitchFamily="34" charset="0"/>
                         <a:ea typeface="Calibri" panose="020F0502020204030204" pitchFamily="34" charset="0"/>
@@ -4100,7 +4353,7 @@
                   </a:ext>
                 </a:extLst>
               </a:tr>
-              <a:tr h="375000">
+              <a:tr h="465138">
                 <a:tc>
                   <a:txBody>
                     <a:bodyPr/>
@@ -4115,7 +4368,7 @@
                         </a:spcAft>
                       </a:pPr>
                       <a:r>
-                        <a:rPr lang="en-CA" sz="600" dirty="0">
+                        <a:rPr lang="en-CA" sz="1800" dirty="0">
                           <a:effectLst/>
                           <a:latin typeface="Segoe UI" panose="020B0502040204020203" pitchFamily="34" charset="0"/>
                           <a:ea typeface="Calibri" panose="020F0502020204030204" pitchFamily="34" charset="0"/>
@@ -4123,7 +4376,7 @@
                         </a:rPr>
                         <a:t>QQQ</a:t>
                       </a:r>
-                      <a:endParaRPr lang="en-CA" sz="1100" dirty="0">
+                      <a:endParaRPr lang="en-CA" sz="1800" dirty="0">
                         <a:effectLst/>
                         <a:latin typeface="Calibri" panose="020F0502020204030204" pitchFamily="34" charset="0"/>
                         <a:ea typeface="Calibri" panose="020F0502020204030204" pitchFamily="34" charset="0"/>
@@ -4151,7 +4404,7 @@
                         </a:spcAft>
                       </a:pPr>
                       <a:r>
-                        <a:rPr lang="en-CA" sz="600" dirty="0">
+                        <a:rPr lang="en-CA" sz="1800" dirty="0">
                           <a:effectLst/>
                           <a:latin typeface="Segoe UI" panose="020B0502040204020203" pitchFamily="34" charset="0"/>
                           <a:ea typeface="Calibri" panose="020F0502020204030204" pitchFamily="34" charset="0"/>
@@ -4159,7 +4412,7 @@
                         </a:rPr>
                         <a:t>59.920913</a:t>
                       </a:r>
-                      <a:endParaRPr lang="en-CA" sz="1100" dirty="0">
+                      <a:endParaRPr lang="en-CA" sz="1800" dirty="0">
                         <a:effectLst/>
                         <a:latin typeface="Calibri" panose="020F0502020204030204" pitchFamily="34" charset="0"/>
                         <a:ea typeface="Calibri" panose="020F0502020204030204" pitchFamily="34" charset="0"/>
@@ -4187,7 +4440,7 @@
                         </a:spcAft>
                       </a:pPr>
                       <a:r>
-                        <a:rPr lang="en-CA" sz="600">
+                        <a:rPr lang="en-CA" sz="1800">
                           <a:effectLst/>
                           <a:latin typeface="Segoe UI" panose="020B0502040204020203" pitchFamily="34" charset="0"/>
                           <a:ea typeface="Calibri" panose="020F0502020204030204" pitchFamily="34" charset="0"/>
@@ -4195,7 +4448,7 @@
                         </a:rPr>
                         <a:t>47.159013</a:t>
                       </a:r>
-                      <a:endParaRPr lang="en-CA" sz="1100">
+                      <a:endParaRPr lang="en-CA" sz="1800">
                         <a:effectLst/>
                         <a:latin typeface="Calibri" panose="020F0502020204030204" pitchFamily="34" charset="0"/>
                         <a:ea typeface="Calibri" panose="020F0502020204030204" pitchFamily="34" charset="0"/>
@@ -4223,7 +4476,7 @@
                         </a:spcAft>
                       </a:pPr>
                       <a:r>
-                        <a:rPr lang="en-CA" sz="600">
+                        <a:rPr lang="en-CA" sz="1800">
                           <a:effectLst/>
                           <a:latin typeface="Segoe UI" panose="020B0502040204020203" pitchFamily="34" charset="0"/>
                           <a:ea typeface="Calibri" panose="020F0502020204030204" pitchFamily="34" charset="0"/>
@@ -4231,7 +4484,7 @@
                         </a:rPr>
                         <a:t>55.183996</a:t>
                       </a:r>
-                      <a:endParaRPr lang="en-CA" sz="1100">
+                      <a:endParaRPr lang="en-CA" sz="1800">
                         <a:effectLst/>
                         <a:latin typeface="Calibri" panose="020F0502020204030204" pitchFamily="34" charset="0"/>
                         <a:ea typeface="Calibri" panose="020F0502020204030204" pitchFamily="34" charset="0"/>
@@ -4259,7 +4512,7 @@
                         </a:spcAft>
                       </a:pPr>
                       <a:r>
-                        <a:rPr lang="en-CA" sz="600">
+                        <a:rPr lang="en-CA" sz="1800">
                           <a:effectLst/>
                           <a:latin typeface="Segoe UI" panose="020B0502040204020203" pitchFamily="34" charset="0"/>
                           <a:ea typeface="Calibri" panose="020F0502020204030204" pitchFamily="34" charset="0"/>
@@ -4267,7 +4520,7 @@
                         </a:rPr>
                         <a:t>28.625007</a:t>
                       </a:r>
-                      <a:endParaRPr lang="en-CA" sz="1100">
+                      <a:endParaRPr lang="en-CA" sz="1800">
                         <a:effectLst/>
                         <a:latin typeface="Calibri" panose="020F0502020204030204" pitchFamily="34" charset="0"/>
                         <a:ea typeface="Calibri" panose="020F0502020204030204" pitchFamily="34" charset="0"/>
@@ -4287,7 +4540,7 @@
                   </a:ext>
                 </a:extLst>
               </a:tr>
-              <a:tr h="375000">
+              <a:tr h="465138">
                 <a:tc>
                   <a:txBody>
                     <a:bodyPr/>
@@ -4302,7 +4555,7 @@
                         </a:spcAft>
                       </a:pPr>
                       <a:r>
-                        <a:rPr lang="en-CA" sz="600" dirty="0">
+                        <a:rPr lang="en-CA" sz="1800" dirty="0">
                           <a:effectLst/>
                           <a:latin typeface="Segoe UI" panose="020B0502040204020203" pitchFamily="34" charset="0"/>
                           <a:ea typeface="Calibri" panose="020F0502020204030204" pitchFamily="34" charset="0"/>
@@ -4310,7 +4563,7 @@
                         </a:rPr>
                         <a:t>VTI</a:t>
                       </a:r>
-                      <a:endParaRPr lang="en-CA" sz="1100" dirty="0">
+                      <a:endParaRPr lang="en-CA" sz="1800" dirty="0">
                         <a:effectLst/>
                         <a:latin typeface="Calibri" panose="020F0502020204030204" pitchFamily="34" charset="0"/>
                         <a:ea typeface="Calibri" panose="020F0502020204030204" pitchFamily="34" charset="0"/>
@@ -4338,7 +4591,7 @@
                         </a:spcAft>
                       </a:pPr>
                       <a:r>
-                        <a:rPr lang="en-CA" sz="600">
+                        <a:rPr lang="en-CA" sz="1800" dirty="0">
                           <a:effectLst/>
                           <a:latin typeface="Segoe UI" panose="020B0502040204020203" pitchFamily="34" charset="0"/>
                           <a:ea typeface="Calibri" panose="020F0502020204030204" pitchFamily="34" charset="0"/>
@@ -4346,7 +4599,7 @@
                         </a:rPr>
                         <a:t>27.024997</a:t>
                       </a:r>
-                      <a:endParaRPr lang="en-CA" sz="1100">
+                      <a:endParaRPr lang="en-CA" sz="1800" dirty="0">
                         <a:effectLst/>
                         <a:latin typeface="Calibri" panose="020F0502020204030204" pitchFamily="34" charset="0"/>
                         <a:ea typeface="Calibri" panose="020F0502020204030204" pitchFamily="34" charset="0"/>
@@ -4374,7 +4627,7 @@
                         </a:spcAft>
                       </a:pPr>
                       <a:r>
-                        <a:rPr lang="en-CA" sz="600">
+                        <a:rPr lang="en-CA" sz="1800">
                           <a:effectLst/>
                           <a:latin typeface="Segoe UI" panose="020B0502040204020203" pitchFamily="34" charset="0"/>
                           <a:ea typeface="Calibri" panose="020F0502020204030204" pitchFamily="34" charset="0"/>
@@ -4382,7 +4635,7 @@
                         </a:rPr>
                         <a:t>21.873049</a:t>
                       </a:r>
-                      <a:endParaRPr lang="en-CA" sz="1100">
+                      <a:endParaRPr lang="en-CA" sz="1800">
                         <a:effectLst/>
                         <a:latin typeface="Calibri" panose="020F0502020204030204" pitchFamily="34" charset="0"/>
                         <a:ea typeface="Calibri" panose="020F0502020204030204" pitchFamily="34" charset="0"/>
@@ -4410,7 +4663,7 @@
                         </a:spcAft>
                       </a:pPr>
                       <a:r>
-                        <a:rPr lang="en-CA" sz="600">
+                        <a:rPr lang="en-CA" sz="1800">
                           <a:effectLst/>
                           <a:latin typeface="Segoe UI" panose="020B0502040204020203" pitchFamily="34" charset="0"/>
                           <a:ea typeface="Calibri" panose="020F0502020204030204" pitchFamily="34" charset="0"/>
@@ -4418,7 +4671,7 @@
                         </a:rPr>
                         <a:t>31.169354</a:t>
                       </a:r>
-                      <a:endParaRPr lang="en-CA" sz="1100">
+                      <a:endParaRPr lang="en-CA" sz="1800">
                         <a:effectLst/>
                         <a:latin typeface="Calibri" panose="020F0502020204030204" pitchFamily="34" charset="0"/>
                         <a:ea typeface="Calibri" panose="020F0502020204030204" pitchFamily="34" charset="0"/>
@@ -4446,7 +4699,7 @@
                         </a:spcAft>
                       </a:pPr>
                       <a:r>
-                        <a:rPr lang="en-CA" sz="600">
+                        <a:rPr lang="en-CA" sz="1800">
                           <a:effectLst/>
                           <a:latin typeface="Segoe UI" panose="020B0502040204020203" pitchFamily="34" charset="0"/>
                           <a:ea typeface="Calibri" panose="020F0502020204030204" pitchFamily="34" charset="0"/>
@@ -4454,7 +4707,7 @@
                         </a:rPr>
                         <a:t>25.835205</a:t>
                       </a:r>
-                      <a:endParaRPr lang="en-CA" sz="1100">
+                      <a:endParaRPr lang="en-CA" sz="1800">
                         <a:effectLst/>
                         <a:latin typeface="Calibri" panose="020F0502020204030204" pitchFamily="34" charset="0"/>
                         <a:ea typeface="Calibri" panose="020F0502020204030204" pitchFamily="34" charset="0"/>
@@ -4474,7 +4727,7 @@
                   </a:ext>
                 </a:extLst>
               </a:tr>
-              <a:tr h="375000">
+              <a:tr h="465138">
                 <a:tc>
                   <a:txBody>
                     <a:bodyPr/>
@@ -4489,7 +4742,7 @@
                         </a:spcAft>
                       </a:pPr>
                       <a:r>
-                        <a:rPr lang="en-CA" sz="600" dirty="0">
+                        <a:rPr lang="en-CA" sz="1800" dirty="0">
                           <a:effectLst/>
                           <a:latin typeface="Segoe UI" panose="020B0502040204020203" pitchFamily="34" charset="0"/>
                           <a:ea typeface="Calibri" panose="020F0502020204030204" pitchFamily="34" charset="0"/>
@@ -4497,7 +4750,7 @@
                         </a:rPr>
                         <a:t>XLK</a:t>
                       </a:r>
-                      <a:endParaRPr lang="en-CA" sz="1100" dirty="0">
+                      <a:endParaRPr lang="en-CA" sz="1800" dirty="0">
                         <a:effectLst/>
                         <a:latin typeface="Calibri" panose="020F0502020204030204" pitchFamily="34" charset="0"/>
                         <a:ea typeface="Calibri" panose="020F0502020204030204" pitchFamily="34" charset="0"/>
@@ -4525,7 +4778,7 @@
                         </a:spcAft>
                       </a:pPr>
                       <a:r>
-                        <a:rPr lang="en-CA" sz="600">
+                        <a:rPr lang="en-CA" sz="1800">
                           <a:effectLst/>
                           <a:latin typeface="Segoe UI" panose="020B0502040204020203" pitchFamily="34" charset="0"/>
                           <a:ea typeface="Calibri" panose="020F0502020204030204" pitchFamily="34" charset="0"/>
@@ -4533,7 +4786,7 @@
                         </a:rPr>
                         <a:t>57.365362</a:t>
                       </a:r>
-                      <a:endParaRPr lang="en-CA" sz="1100">
+                      <a:endParaRPr lang="en-CA" sz="1800">
                         <a:effectLst/>
                         <a:latin typeface="Calibri" panose="020F0502020204030204" pitchFamily="34" charset="0"/>
                         <a:ea typeface="Calibri" panose="020F0502020204030204" pitchFamily="34" charset="0"/>
@@ -4561,7 +4814,7 @@
                         </a:spcAft>
                       </a:pPr>
                       <a:r>
-                        <a:rPr lang="en-CA" sz="600" dirty="0">
+                        <a:rPr lang="en-CA" sz="1800" dirty="0">
                           <a:effectLst/>
                           <a:latin typeface="Segoe UI" panose="020B0502040204020203" pitchFamily="34" charset="0"/>
                           <a:ea typeface="Calibri" panose="020F0502020204030204" pitchFamily="34" charset="0"/>
@@ -4569,7 +4822,7 @@
                         </a:rPr>
                         <a:t>51.906531</a:t>
                       </a:r>
-                      <a:endParaRPr lang="en-CA" sz="1100" dirty="0">
+                      <a:endParaRPr lang="en-CA" sz="1800" dirty="0">
                         <a:effectLst/>
                         <a:latin typeface="Calibri" panose="020F0502020204030204" pitchFamily="34" charset="0"/>
                         <a:ea typeface="Calibri" panose="020F0502020204030204" pitchFamily="34" charset="0"/>
@@ -4597,7 +4850,7 @@
                         </a:spcAft>
                       </a:pPr>
                       <a:r>
-                        <a:rPr lang="en-CA" sz="600" dirty="0">
+                        <a:rPr lang="en-CA" sz="1800" dirty="0">
                           <a:effectLst/>
                           <a:latin typeface="Segoe UI" panose="020B0502040204020203" pitchFamily="34" charset="0"/>
                           <a:ea typeface="Calibri" panose="020F0502020204030204" pitchFamily="34" charset="0"/>
@@ -4605,7 +4858,7 @@
                         </a:rPr>
                         <a:t>65.081789</a:t>
                       </a:r>
-                      <a:endParaRPr lang="en-CA" sz="1100" dirty="0">
+                      <a:endParaRPr lang="en-CA" sz="1800" dirty="0">
                         <a:effectLst/>
                         <a:latin typeface="Calibri" panose="020F0502020204030204" pitchFamily="34" charset="0"/>
                         <a:ea typeface="Calibri" panose="020F0502020204030204" pitchFamily="34" charset="0"/>
@@ -4633,7 +4886,7 @@
                         </a:spcAft>
                       </a:pPr>
                       <a:r>
-                        <a:rPr lang="en-CA" sz="600">
+                        <a:rPr lang="en-CA" sz="1800">
                           <a:effectLst/>
                           <a:latin typeface="Segoe UI" panose="020B0502040204020203" pitchFamily="34" charset="0"/>
                           <a:ea typeface="Calibri" panose="020F0502020204030204" pitchFamily="34" charset="0"/>
@@ -4641,7 +4894,7 @@
                         </a:rPr>
                         <a:t>35.942137</a:t>
                       </a:r>
-                      <a:endParaRPr lang="en-CA" sz="1100">
+                      <a:endParaRPr lang="en-CA" sz="1800">
                         <a:effectLst/>
                         <a:latin typeface="Calibri" panose="020F0502020204030204" pitchFamily="34" charset="0"/>
                         <a:ea typeface="Calibri" panose="020F0502020204030204" pitchFamily="34" charset="0"/>
@@ -4661,7 +4914,7 @@
                   </a:ext>
                 </a:extLst>
               </a:tr>
-              <a:tr h="375000">
+              <a:tr h="465138">
                 <a:tc>
                   <a:txBody>
                     <a:bodyPr/>
@@ -4676,7 +4929,7 @@
                         </a:spcAft>
                       </a:pPr>
                       <a:r>
-                        <a:rPr lang="en-CA" sz="600" dirty="0">
+                        <a:rPr lang="en-CA" sz="1800" dirty="0">
                           <a:effectLst/>
                           <a:latin typeface="Segoe UI" panose="020B0502040204020203" pitchFamily="34" charset="0"/>
                           <a:ea typeface="Calibri" panose="020F0502020204030204" pitchFamily="34" charset="0"/>
@@ -4684,7 +4937,7 @@
                         </a:rPr>
                         <a:t>XLY</a:t>
                       </a:r>
-                      <a:endParaRPr lang="en-CA" sz="1100" dirty="0">
+                      <a:endParaRPr lang="en-CA" sz="1800" dirty="0">
                         <a:effectLst/>
                         <a:latin typeface="Calibri" panose="020F0502020204030204" pitchFamily="34" charset="0"/>
                         <a:ea typeface="Calibri" panose="020F0502020204030204" pitchFamily="34" charset="0"/>
@@ -4712,7 +4965,7 @@
                         </a:spcAft>
                       </a:pPr>
                       <a:r>
-                        <a:rPr lang="en-CA" sz="600">
+                        <a:rPr lang="en-CA" sz="1800">
                           <a:effectLst/>
                           <a:latin typeface="Segoe UI" panose="020B0502040204020203" pitchFamily="34" charset="0"/>
                           <a:ea typeface="Calibri" panose="020F0502020204030204" pitchFamily="34" charset="0"/>
@@ -4720,7 +4973,7 @@
                         </a:rPr>
                         <a:t>41.954259</a:t>
                       </a:r>
-                      <a:endParaRPr lang="en-CA" sz="1100">
+                      <a:endParaRPr lang="en-CA" sz="1800">
                         <a:effectLst/>
                         <a:latin typeface="Calibri" panose="020F0502020204030204" pitchFamily="34" charset="0"/>
                         <a:ea typeface="Calibri" panose="020F0502020204030204" pitchFamily="34" charset="0"/>
@@ -4748,7 +5001,7 @@
                         </a:spcAft>
                       </a:pPr>
                       <a:r>
-                        <a:rPr lang="en-CA" sz="600">
+                        <a:rPr lang="en-CA" sz="1800">
                           <a:effectLst/>
                           <a:latin typeface="Segoe UI" panose="020B0502040204020203" pitchFamily="34" charset="0"/>
                           <a:ea typeface="Calibri" panose="020F0502020204030204" pitchFamily="34" charset="0"/>
@@ -4756,7 +5009,7 @@
                         </a:rPr>
                         <a:t>30.230958</a:t>
                       </a:r>
-                      <a:endParaRPr lang="en-CA" sz="1100">
+                      <a:endParaRPr lang="en-CA" sz="1800">
                         <a:effectLst/>
                         <a:latin typeface="Calibri" panose="020F0502020204030204" pitchFamily="34" charset="0"/>
                         <a:ea typeface="Calibri" panose="020F0502020204030204" pitchFamily="34" charset="0"/>
@@ -4784,7 +5037,7 @@
                         </a:spcAft>
                       </a:pPr>
                       <a:r>
-                        <a:rPr lang="en-CA" sz="600" dirty="0">
+                        <a:rPr lang="en-CA" sz="1800" dirty="0">
                           <a:effectLst/>
                           <a:latin typeface="Segoe UI" panose="020B0502040204020203" pitchFamily="34" charset="0"/>
                           <a:ea typeface="Calibri" panose="020F0502020204030204" pitchFamily="34" charset="0"/>
@@ -4792,7 +5045,7 @@
                         </a:rPr>
                         <a:t>36.489073</a:t>
                       </a:r>
-                      <a:endParaRPr lang="en-CA" sz="1100" dirty="0">
+                      <a:endParaRPr lang="en-CA" sz="1800" dirty="0">
                         <a:effectLst/>
                         <a:latin typeface="Calibri" panose="020F0502020204030204" pitchFamily="34" charset="0"/>
                         <a:ea typeface="Calibri" panose="020F0502020204030204" pitchFamily="34" charset="0"/>
@@ -4820,7 +5073,7 @@
                         </a:spcAft>
                       </a:pPr>
                       <a:r>
-                        <a:rPr lang="en-CA" sz="600">
+                        <a:rPr lang="en-CA" sz="1800">
                           <a:effectLst/>
                           <a:latin typeface="Segoe UI" panose="020B0502040204020203" pitchFamily="34" charset="0"/>
                           <a:ea typeface="Calibri" panose="020F0502020204030204" pitchFamily="34" charset="0"/>
@@ -4828,7 +5081,7 @@
                         </a:rPr>
                         <a:t>28.239873</a:t>
                       </a:r>
-                      <a:endParaRPr lang="en-CA" sz="1100">
+                      <a:endParaRPr lang="en-CA" sz="1800">
                         <a:effectLst/>
                         <a:latin typeface="Calibri" panose="020F0502020204030204" pitchFamily="34" charset="0"/>
                         <a:ea typeface="Calibri" panose="020F0502020204030204" pitchFamily="34" charset="0"/>
@@ -4848,7 +5101,7 @@
                   </a:ext>
                 </a:extLst>
               </a:tr>
-              <a:tr h="375000">
+              <a:tr h="465138">
                 <a:tc>
                   <a:txBody>
                     <a:bodyPr/>
@@ -4863,7 +5116,7 @@
                         </a:spcAft>
                       </a:pPr>
                       <a:r>
-                        <a:rPr lang="en-CA" sz="600" dirty="0">
+                        <a:rPr lang="en-CA" sz="1800" dirty="0">
                           <a:effectLst/>
                           <a:latin typeface="Segoe UI" panose="020B0502040204020203" pitchFamily="34" charset="0"/>
                           <a:ea typeface="Calibri" panose="020F0502020204030204" pitchFamily="34" charset="0"/>
@@ -4871,7 +5124,7 @@
                         </a:rPr>
                         <a:t>XLP</a:t>
                       </a:r>
-                      <a:endParaRPr lang="en-CA" sz="1100" dirty="0">
+                      <a:endParaRPr lang="en-CA" sz="1800" dirty="0">
                         <a:effectLst/>
                         <a:latin typeface="Calibri" panose="020F0502020204030204" pitchFamily="34" charset="0"/>
                         <a:ea typeface="Calibri" panose="020F0502020204030204" pitchFamily="34" charset="0"/>
@@ -4899,7 +5152,7 @@
                         </a:spcAft>
                       </a:pPr>
                       <a:r>
-                        <a:rPr lang="en-CA" sz="600">
+                        <a:rPr lang="en-CA" sz="1800">
                           <a:effectLst/>
                           <a:latin typeface="Segoe UI" panose="020B0502040204020203" pitchFamily="34" charset="0"/>
                           <a:ea typeface="Calibri" panose="020F0502020204030204" pitchFamily="34" charset="0"/>
@@ -4907,7 +5160,7 @@
                         </a:rPr>
                         <a:t>13.755392</a:t>
                       </a:r>
-                      <a:endParaRPr lang="en-CA" sz="1100">
+                      <a:endParaRPr lang="en-CA" sz="1800">
                         <a:effectLst/>
                         <a:latin typeface="Calibri" panose="020F0502020204030204" pitchFamily="34" charset="0"/>
                         <a:ea typeface="Calibri" panose="020F0502020204030204" pitchFamily="34" charset="0"/>
@@ -4935,7 +5188,7 @@
                         </a:spcAft>
                       </a:pPr>
                       <a:r>
-                        <a:rPr lang="en-CA" sz="600">
+                        <a:rPr lang="en-CA" sz="1800">
                           <a:effectLst/>
                           <a:latin typeface="Segoe UI" panose="020B0502040204020203" pitchFamily="34" charset="0"/>
                           <a:ea typeface="Calibri" panose="020F0502020204030204" pitchFamily="34" charset="0"/>
@@ -4943,7 +5196,7 @@
                         </a:rPr>
                         <a:t>9.824019</a:t>
                       </a:r>
-                      <a:endParaRPr lang="en-CA" sz="1100">
+                      <a:endParaRPr lang="en-CA" sz="1800">
                         <a:effectLst/>
                         <a:latin typeface="Calibri" panose="020F0502020204030204" pitchFamily="34" charset="0"/>
                         <a:ea typeface="Calibri" panose="020F0502020204030204" pitchFamily="34" charset="0"/>
@@ -4971,7 +5224,7 @@
                         </a:spcAft>
                       </a:pPr>
                       <a:r>
-                        <a:rPr lang="en-CA" sz="600">
+                        <a:rPr lang="en-CA" sz="1800">
                           <a:effectLst/>
                           <a:latin typeface="Segoe UI" panose="020B0502040204020203" pitchFamily="34" charset="0"/>
                           <a:ea typeface="Calibri" panose="020F0502020204030204" pitchFamily="34" charset="0"/>
@@ -4979,7 +5232,7 @@
                         </a:rPr>
                         <a:t>17.878729</a:t>
                       </a:r>
-                      <a:endParaRPr lang="en-CA" sz="1100">
+                      <a:endParaRPr lang="en-CA" sz="1800">
                         <a:effectLst/>
                         <a:latin typeface="Calibri" panose="020F0502020204030204" pitchFamily="34" charset="0"/>
                         <a:ea typeface="Calibri" panose="020F0502020204030204" pitchFamily="34" charset="0"/>
@@ -5007,7 +5260,7 @@
                         </a:spcAft>
                       </a:pPr>
                       <a:r>
-                        <a:rPr lang="en-CA" sz="600">
+                        <a:rPr lang="en-CA" sz="1800">
                           <a:effectLst/>
                           <a:latin typeface="Segoe UI" panose="020B0502040204020203" pitchFamily="34" charset="0"/>
                           <a:ea typeface="Calibri" panose="020F0502020204030204" pitchFamily="34" charset="0"/>
@@ -5015,7 +5268,7 @@
                         </a:rPr>
                         <a:t>15.572541</a:t>
                       </a:r>
-                      <a:endParaRPr lang="en-CA" sz="1100">
+                      <a:endParaRPr lang="en-CA" sz="1800">
                         <a:effectLst/>
                         <a:latin typeface="Calibri" panose="020F0502020204030204" pitchFamily="34" charset="0"/>
                         <a:ea typeface="Calibri" panose="020F0502020204030204" pitchFamily="34" charset="0"/>
@@ -5035,7 +5288,7 @@
                   </a:ext>
                 </a:extLst>
               </a:tr>
-              <a:tr h="375000">
+              <a:tr h="465138">
                 <a:tc>
                   <a:txBody>
                     <a:bodyPr/>
@@ -5050,7 +5303,7 @@
                         </a:spcAft>
                       </a:pPr>
                       <a:r>
-                        <a:rPr lang="en-CA" sz="600" dirty="0">
+                        <a:rPr lang="en-CA" sz="1800" dirty="0">
                           <a:effectLst/>
                           <a:latin typeface="Segoe UI" panose="020B0502040204020203" pitchFamily="34" charset="0"/>
                           <a:ea typeface="Calibri" panose="020F0502020204030204" pitchFamily="34" charset="0"/>
@@ -5058,7 +5311,7 @@
                         </a:rPr>
                         <a:t>XLV</a:t>
                       </a:r>
-                      <a:endParaRPr lang="en-CA" sz="1100" dirty="0">
+                      <a:endParaRPr lang="en-CA" sz="1800" dirty="0">
                         <a:effectLst/>
                         <a:latin typeface="Calibri" panose="020F0502020204030204" pitchFamily="34" charset="0"/>
                         <a:ea typeface="Calibri" panose="020F0502020204030204" pitchFamily="34" charset="0"/>
@@ -5086,7 +5339,7 @@
                         </a:spcAft>
                       </a:pPr>
                       <a:r>
-                        <a:rPr lang="en-CA" sz="600">
+                        <a:rPr lang="en-CA" sz="1800">
                           <a:effectLst/>
                           <a:latin typeface="Segoe UI" panose="020B0502040204020203" pitchFamily="34" charset="0"/>
                           <a:ea typeface="Calibri" panose="020F0502020204030204" pitchFamily="34" charset="0"/>
@@ -5094,7 +5347,7 @@
                         </a:rPr>
                         <a:t>30.093911</a:t>
                       </a:r>
-                      <a:endParaRPr lang="en-CA" sz="1100">
+                      <a:endParaRPr lang="en-CA" sz="1800">
                         <a:effectLst/>
                         <a:latin typeface="Calibri" panose="020F0502020204030204" pitchFamily="34" charset="0"/>
                         <a:ea typeface="Calibri" panose="020F0502020204030204" pitchFamily="34" charset="0"/>
@@ -5122,7 +5375,7 @@
                         </a:spcAft>
                       </a:pPr>
                       <a:r>
-                        <a:rPr lang="en-CA" sz="600">
+                        <a:rPr lang="en-CA" sz="1800">
                           <a:effectLst/>
                           <a:latin typeface="Segoe UI" panose="020B0502040204020203" pitchFamily="34" charset="0"/>
                           <a:ea typeface="Calibri" panose="020F0502020204030204" pitchFamily="34" charset="0"/>
@@ -5130,7 +5383,7 @@
                         </a:rPr>
                         <a:t>20.873221</a:t>
                       </a:r>
-                      <a:endParaRPr lang="en-CA" sz="1100">
+                      <a:endParaRPr lang="en-CA" sz="1800">
                         <a:effectLst/>
                         <a:latin typeface="Calibri" panose="020F0502020204030204" pitchFamily="34" charset="0"/>
                         <a:ea typeface="Calibri" panose="020F0502020204030204" pitchFamily="34" charset="0"/>
@@ -5158,7 +5411,7 @@
                         </a:spcAft>
                       </a:pPr>
                       <a:r>
-                        <a:rPr lang="en-CA" sz="600">
+                        <a:rPr lang="en-CA" sz="1800">
                           <a:effectLst/>
                           <a:latin typeface="Segoe UI" panose="020B0502040204020203" pitchFamily="34" charset="0"/>
                           <a:ea typeface="Calibri" panose="020F0502020204030204" pitchFamily="34" charset="0"/>
@@ -5166,7 +5419,7 @@
                         </a:rPr>
                         <a:t>22.930393</a:t>
                       </a:r>
-                      <a:endParaRPr lang="en-CA" sz="1100">
+                      <a:endParaRPr lang="en-CA" sz="1800">
                         <a:effectLst/>
                         <a:latin typeface="Calibri" panose="020F0502020204030204" pitchFamily="34" charset="0"/>
                         <a:ea typeface="Calibri" panose="020F0502020204030204" pitchFamily="34" charset="0"/>
@@ -5194,7 +5447,7 @@
                         </a:spcAft>
                       </a:pPr>
                       <a:r>
-                        <a:rPr lang="en-CA" sz="600">
+                        <a:rPr lang="en-CA" sz="1800">
                           <a:effectLst/>
                           <a:latin typeface="Segoe UI" panose="020B0502040204020203" pitchFamily="34" charset="0"/>
                           <a:ea typeface="Calibri" panose="020F0502020204030204" pitchFamily="34" charset="0"/>
@@ -5202,7 +5455,7 @@
                         </a:rPr>
                         <a:t>24.736612</a:t>
                       </a:r>
-                      <a:endParaRPr lang="en-CA" sz="1100">
+                      <a:endParaRPr lang="en-CA" sz="1800">
                         <a:effectLst/>
                         <a:latin typeface="Calibri" panose="020F0502020204030204" pitchFamily="34" charset="0"/>
                         <a:ea typeface="Calibri" panose="020F0502020204030204" pitchFamily="34" charset="0"/>
@@ -5222,7 +5475,7 @@
                   </a:ext>
                 </a:extLst>
               </a:tr>
-              <a:tr h="375000">
+              <a:tr h="465138">
                 <a:tc>
                   <a:txBody>
                     <a:bodyPr/>
@@ -5237,7 +5490,7 @@
                         </a:spcAft>
                       </a:pPr>
                       <a:r>
-                        <a:rPr lang="en-CA" sz="600" dirty="0">
+                        <a:rPr lang="en-CA" sz="1800" dirty="0">
                           <a:effectLst/>
                           <a:latin typeface="Segoe UI" panose="020B0502040204020203" pitchFamily="34" charset="0"/>
                           <a:ea typeface="Calibri" panose="020F0502020204030204" pitchFamily="34" charset="0"/>
@@ -5245,7 +5498,7 @@
                         </a:rPr>
                         <a:t>XLI</a:t>
                       </a:r>
-                      <a:endParaRPr lang="en-CA" sz="1100" dirty="0">
+                      <a:endParaRPr lang="en-CA" sz="1800" dirty="0">
                         <a:effectLst/>
                         <a:latin typeface="Calibri" panose="020F0502020204030204" pitchFamily="34" charset="0"/>
                         <a:ea typeface="Calibri" panose="020F0502020204030204" pitchFamily="34" charset="0"/>
@@ -5273,7 +5526,7 @@
                         </a:spcAft>
                       </a:pPr>
                       <a:r>
-                        <a:rPr lang="en-CA" sz="600">
+                        <a:rPr lang="en-CA" sz="1800">
                           <a:effectLst/>
                           <a:latin typeface="Segoe UI" panose="020B0502040204020203" pitchFamily="34" charset="0"/>
                           <a:ea typeface="Calibri" panose="020F0502020204030204" pitchFamily="34" charset="0"/>
@@ -5281,7 +5534,7 @@
                         </a:rPr>
                         <a:t>20.678455</a:t>
                       </a:r>
-                      <a:endParaRPr lang="en-CA" sz="1100">
+                      <a:endParaRPr lang="en-CA" sz="1800">
                         <a:effectLst/>
                         <a:latin typeface="Calibri" panose="020F0502020204030204" pitchFamily="34" charset="0"/>
                         <a:ea typeface="Calibri" panose="020F0502020204030204" pitchFamily="34" charset="0"/>
@@ -5309,7 +5562,7 @@
                         </a:spcAft>
                       </a:pPr>
                       <a:r>
-                        <a:rPr lang="en-CA" sz="600">
+                        <a:rPr lang="en-CA" sz="1800">
                           <a:effectLst/>
                           <a:latin typeface="Segoe UI" panose="020B0502040204020203" pitchFamily="34" charset="0"/>
                           <a:ea typeface="Calibri" panose="020F0502020204030204" pitchFamily="34" charset="0"/>
@@ -5317,7 +5570,7 @@
                         </a:rPr>
                         <a:t>14.01157</a:t>
                       </a:r>
-                      <a:endParaRPr lang="en-CA" sz="1100">
+                      <a:endParaRPr lang="en-CA" sz="1800">
                         <a:effectLst/>
                         <a:latin typeface="Calibri" panose="020F0502020204030204" pitchFamily="34" charset="0"/>
                         <a:ea typeface="Calibri" panose="020F0502020204030204" pitchFamily="34" charset="0"/>
@@ -5345,7 +5598,7 @@
                         </a:spcAft>
                       </a:pPr>
                       <a:r>
-                        <a:rPr lang="en-CA" sz="600">
+                        <a:rPr lang="en-CA" sz="1800">
                           <a:effectLst/>
                           <a:latin typeface="Segoe UI" panose="020B0502040204020203" pitchFamily="34" charset="0"/>
                           <a:ea typeface="Calibri" panose="020F0502020204030204" pitchFamily="34" charset="0"/>
@@ -5353,7 +5606,7 @@
                         </a:rPr>
                         <a:t>22.855927</a:t>
                       </a:r>
-                      <a:endParaRPr lang="en-CA" sz="1100">
+                      <a:endParaRPr lang="en-CA" sz="1800">
                         <a:effectLst/>
                         <a:latin typeface="Calibri" panose="020F0502020204030204" pitchFamily="34" charset="0"/>
                         <a:ea typeface="Calibri" panose="020F0502020204030204" pitchFamily="34" charset="0"/>
@@ -5381,7 +5634,7 @@
                         </a:spcAft>
                       </a:pPr>
                       <a:r>
-                        <a:rPr lang="en-CA" sz="600">
+                        <a:rPr lang="en-CA" sz="1800" dirty="0">
                           <a:effectLst/>
                           <a:latin typeface="Segoe UI" panose="020B0502040204020203" pitchFamily="34" charset="0"/>
                           <a:ea typeface="Calibri" panose="020F0502020204030204" pitchFamily="34" charset="0"/>
@@ -5389,7 +5642,7 @@
                         </a:rPr>
                         <a:t>22.451097</a:t>
                       </a:r>
-                      <a:endParaRPr lang="en-CA" sz="1100">
+                      <a:endParaRPr lang="en-CA" sz="1800" dirty="0">
                         <a:effectLst/>
                         <a:latin typeface="Calibri" panose="020F0502020204030204" pitchFamily="34" charset="0"/>
                         <a:ea typeface="Calibri" panose="020F0502020204030204" pitchFamily="34" charset="0"/>
@@ -5409,7 +5662,7 @@
                   </a:ext>
                 </a:extLst>
               </a:tr>
-              <a:tr h="375000">
+              <a:tr h="465138">
                 <a:tc>
                   <a:txBody>
                     <a:bodyPr/>
@@ -5424,7 +5677,7 @@
                         </a:spcAft>
                       </a:pPr>
                       <a:r>
-                        <a:rPr lang="en-CA" sz="600" dirty="0">
+                        <a:rPr lang="en-CA" sz="1800" dirty="0">
                           <a:effectLst/>
                           <a:latin typeface="Segoe UI" panose="020B0502040204020203" pitchFamily="34" charset="0"/>
                           <a:ea typeface="Calibri" panose="020F0502020204030204" pitchFamily="34" charset="0"/>
@@ -5432,7 +5685,7 @@
                         </a:rPr>
                         <a:t>XLF</a:t>
                       </a:r>
-                      <a:endParaRPr lang="en-CA" sz="1100" dirty="0">
+                      <a:endParaRPr lang="en-CA" sz="1800" dirty="0">
                         <a:effectLst/>
                         <a:latin typeface="Calibri" panose="020F0502020204030204" pitchFamily="34" charset="0"/>
                         <a:ea typeface="Calibri" panose="020F0502020204030204" pitchFamily="34" charset="0"/>
@@ -5460,7 +5713,7 @@
                         </a:spcAft>
                       </a:pPr>
                       <a:r>
-                        <a:rPr lang="en-CA" sz="600">
+                        <a:rPr lang="en-CA" sz="1800">
                           <a:effectLst/>
                           <a:latin typeface="Segoe UI" panose="020B0502040204020203" pitchFamily="34" charset="0"/>
                           <a:ea typeface="Calibri" panose="020F0502020204030204" pitchFamily="34" charset="0"/>
@@ -5468,7 +5721,7 @@
                         </a:rPr>
                         <a:t>26.034896</a:t>
                       </a:r>
-                      <a:endParaRPr lang="en-CA" sz="1100">
+                      <a:endParaRPr lang="en-CA" sz="1800">
                         <a:effectLst/>
                         <a:latin typeface="Calibri" panose="020F0502020204030204" pitchFamily="34" charset="0"/>
                         <a:ea typeface="Calibri" panose="020F0502020204030204" pitchFamily="34" charset="0"/>
@@ -5496,7 +5749,7 @@
                         </a:spcAft>
                       </a:pPr>
                       <a:r>
-                        <a:rPr lang="en-CA" sz="600">
+                        <a:rPr lang="en-CA" sz="1800">
                           <a:effectLst/>
                           <a:latin typeface="Segoe UI" panose="020B0502040204020203" pitchFamily="34" charset="0"/>
                           <a:ea typeface="Calibri" panose="020F0502020204030204" pitchFamily="34" charset="0"/>
@@ -5504,7 +5757,7 @@
                         </a:rPr>
                         <a:t>13.591397</a:t>
                       </a:r>
-                      <a:endParaRPr lang="en-CA" sz="1100">
+                      <a:endParaRPr lang="en-CA" sz="1800">
                         <a:effectLst/>
                         <a:latin typeface="Calibri" panose="020F0502020204030204" pitchFamily="34" charset="0"/>
                         <a:ea typeface="Calibri" panose="020F0502020204030204" pitchFamily="34" charset="0"/>
@@ -5532,7 +5785,7 @@
                         </a:spcAft>
                       </a:pPr>
                       <a:r>
-                        <a:rPr lang="en-CA" sz="600">
+                        <a:rPr lang="en-CA" sz="1800">
                           <a:effectLst/>
                           <a:latin typeface="Segoe UI" panose="020B0502040204020203" pitchFamily="34" charset="0"/>
                           <a:ea typeface="Calibri" panose="020F0502020204030204" pitchFamily="34" charset="0"/>
@@ -5540,7 +5793,7 @@
                         </a:rPr>
                         <a:t>22.103918</a:t>
                       </a:r>
-                      <a:endParaRPr lang="en-CA" sz="1100">
+                      <a:endParaRPr lang="en-CA" sz="1800">
                         <a:effectLst/>
                         <a:latin typeface="Calibri" panose="020F0502020204030204" pitchFamily="34" charset="0"/>
                         <a:ea typeface="Calibri" panose="020F0502020204030204" pitchFamily="34" charset="0"/>
@@ -5568,7 +5821,7 @@
                         </a:spcAft>
                       </a:pPr>
                       <a:r>
-                        <a:rPr lang="en-CA" sz="600">
+                        <a:rPr lang="en-CA" sz="1800">
                           <a:effectLst/>
                           <a:latin typeface="Segoe UI" panose="020B0502040204020203" pitchFamily="34" charset="0"/>
                           <a:ea typeface="Calibri" panose="020F0502020204030204" pitchFamily="34" charset="0"/>
@@ -5576,7 +5829,7 @@
                         </a:rPr>
                         <a:t>34.28473</a:t>
                       </a:r>
-                      <a:endParaRPr lang="en-CA" sz="1100">
+                      <a:endParaRPr lang="en-CA" sz="1800">
                         <a:effectLst/>
                         <a:latin typeface="Calibri" panose="020F0502020204030204" pitchFamily="34" charset="0"/>
                         <a:ea typeface="Calibri" panose="020F0502020204030204" pitchFamily="34" charset="0"/>
@@ -5596,7 +5849,7 @@
                   </a:ext>
                 </a:extLst>
               </a:tr>
-              <a:tr h="375000">
+              <a:tr h="465138">
                 <a:tc>
                   <a:txBody>
                     <a:bodyPr/>
@@ -5611,7 +5864,7 @@
                         </a:spcAft>
                       </a:pPr>
                       <a:r>
-                        <a:rPr lang="en-CA" sz="600" dirty="0">
+                        <a:rPr lang="en-CA" sz="1800" dirty="0">
                           <a:effectLst/>
                           <a:latin typeface="Segoe UI" panose="020B0502040204020203" pitchFamily="34" charset="0"/>
                           <a:ea typeface="Calibri" panose="020F0502020204030204" pitchFamily="34" charset="0"/>
@@ -5619,7 +5872,7 @@
                         </a:rPr>
                         <a:t>VNQ</a:t>
                       </a:r>
-                      <a:endParaRPr lang="en-CA" sz="1100" dirty="0">
+                      <a:endParaRPr lang="en-CA" sz="1800" dirty="0">
                         <a:effectLst/>
                         <a:latin typeface="Calibri" panose="020F0502020204030204" pitchFamily="34" charset="0"/>
                         <a:ea typeface="Calibri" panose="020F0502020204030204" pitchFamily="34" charset="0"/>
@@ -5647,7 +5900,7 @@
                         </a:spcAft>
                       </a:pPr>
                       <a:r>
-                        <a:rPr lang="en-CA" sz="600">
+                        <a:rPr lang="en-CA" sz="1800">
                           <a:effectLst/>
                           <a:latin typeface="Segoe UI" panose="020B0502040204020203" pitchFamily="34" charset="0"/>
                           <a:ea typeface="Calibri" panose="020F0502020204030204" pitchFamily="34" charset="0"/>
@@ -5655,7 +5908,7 @@
                         </a:rPr>
                         <a:t>9.834159</a:t>
                       </a:r>
-                      <a:endParaRPr lang="en-CA" sz="1100">
+                      <a:endParaRPr lang="en-CA" sz="1800">
                         <a:effectLst/>
                         <a:latin typeface="Calibri" panose="020F0502020204030204" pitchFamily="34" charset="0"/>
                         <a:ea typeface="Calibri" panose="020F0502020204030204" pitchFamily="34" charset="0"/>
@@ -5683,7 +5936,7 @@
                         </a:spcAft>
                       </a:pPr>
                       <a:r>
-                        <a:rPr lang="en-CA" sz="600">
+                        <a:rPr lang="en-CA" sz="1800">
                           <a:effectLst/>
                           <a:latin typeface="Segoe UI" panose="020B0502040204020203" pitchFamily="34" charset="0"/>
                           <a:ea typeface="Calibri" panose="020F0502020204030204" pitchFamily="34" charset="0"/>
@@ -5691,7 +5944,7 @@
                         </a:rPr>
                         <a:t>8.113414</a:t>
                       </a:r>
-                      <a:endParaRPr lang="en-CA" sz="1100">
+                      <a:endParaRPr lang="en-CA" sz="1800">
                         <a:effectLst/>
                         <a:latin typeface="Calibri" panose="020F0502020204030204" pitchFamily="34" charset="0"/>
                         <a:ea typeface="Calibri" panose="020F0502020204030204" pitchFamily="34" charset="0"/>
@@ -5719,7 +5972,7 @@
                         </a:spcAft>
                       </a:pPr>
                       <a:r>
-                        <a:rPr lang="en-CA" sz="600">
+                        <a:rPr lang="en-CA" sz="1800">
                           <a:effectLst/>
                           <a:latin typeface="Segoe UI" panose="020B0502040204020203" pitchFamily="34" charset="0"/>
                           <a:ea typeface="Calibri" panose="020F0502020204030204" pitchFamily="34" charset="0"/>
@@ -5727,7 +5980,7 @@
                         </a:rPr>
                         <a:t>19.307561</a:t>
                       </a:r>
-                      <a:endParaRPr lang="en-CA" sz="1100">
+                      <a:endParaRPr lang="en-CA" sz="1800">
                         <a:effectLst/>
                         <a:latin typeface="Calibri" panose="020F0502020204030204" pitchFamily="34" charset="0"/>
                         <a:ea typeface="Calibri" panose="020F0502020204030204" pitchFamily="34" charset="0"/>
@@ -5755,7 +6008,7 @@
                         </a:spcAft>
                       </a:pPr>
                       <a:r>
-                        <a:rPr lang="en-CA" sz="600">
+                        <a:rPr lang="en-CA" sz="1800" dirty="0">
                           <a:effectLst/>
                           <a:latin typeface="Segoe UI" panose="020B0502040204020203" pitchFamily="34" charset="0"/>
                           <a:ea typeface="Calibri" panose="020F0502020204030204" pitchFamily="34" charset="0"/>
@@ -5763,7 +6016,7 @@
                         </a:rPr>
                         <a:t>41.182919</a:t>
                       </a:r>
-                      <a:endParaRPr lang="en-CA" sz="1100">
+                      <a:endParaRPr lang="en-CA" sz="1800" dirty="0">
                         <a:effectLst/>
                         <a:latin typeface="Calibri" panose="020F0502020204030204" pitchFamily="34" charset="0"/>
                         <a:ea typeface="Calibri" panose="020F0502020204030204" pitchFamily="34" charset="0"/>
@@ -5783,7 +6036,7 @@
                   </a:ext>
                 </a:extLst>
               </a:tr>
-              <a:tr h="375000">
+              <a:tr h="465138">
                 <a:tc>
                   <a:txBody>
                     <a:bodyPr/>
@@ -5798,7 +6051,7 @@
                         </a:spcAft>
                       </a:pPr>
                       <a:r>
-                        <a:rPr lang="en-CA" sz="600" dirty="0">
+                        <a:rPr lang="en-CA" sz="1800" dirty="0">
                           <a:effectLst/>
                           <a:latin typeface="Segoe UI" panose="020B0502040204020203" pitchFamily="34" charset="0"/>
                           <a:ea typeface="Calibri" panose="020F0502020204030204" pitchFamily="34" charset="0"/>
@@ -5806,7 +6059,7 @@
                         </a:rPr>
                         <a:t>XLE</a:t>
                       </a:r>
-                      <a:endParaRPr lang="en-CA" sz="1100" dirty="0">
+                      <a:endParaRPr lang="en-CA" sz="1800" dirty="0">
                         <a:effectLst/>
                         <a:latin typeface="Calibri" panose="020F0502020204030204" pitchFamily="34" charset="0"/>
                         <a:ea typeface="Calibri" panose="020F0502020204030204" pitchFamily="34" charset="0"/>
@@ -5834,7 +6087,7 @@
                         </a:spcAft>
                       </a:pPr>
                       <a:r>
-                        <a:rPr lang="en-CA" sz="600">
+                        <a:rPr lang="en-CA" sz="1800">
                           <a:effectLst/>
                           <a:latin typeface="Segoe UI" panose="020B0502040204020203" pitchFamily="34" charset="0"/>
                           <a:ea typeface="Calibri" panose="020F0502020204030204" pitchFamily="34" charset="0"/>
@@ -5842,7 +6095,7 @@
                         </a:rPr>
                         <a:t>-2.1886</a:t>
                       </a:r>
-                      <a:endParaRPr lang="en-CA" sz="1100">
+                      <a:endParaRPr lang="en-CA" sz="1800">
                         <a:effectLst/>
                         <a:latin typeface="Calibri" panose="020F0502020204030204" pitchFamily="34" charset="0"/>
                         <a:ea typeface="Calibri" panose="020F0502020204030204" pitchFamily="34" charset="0"/>
@@ -5870,7 +6123,7 @@
                         </a:spcAft>
                       </a:pPr>
                       <a:r>
-                        <a:rPr lang="en-CA" sz="600">
+                        <a:rPr lang="en-CA" sz="1800">
                           <a:effectLst/>
                           <a:latin typeface="Segoe UI" panose="020B0502040204020203" pitchFamily="34" charset="0"/>
                           <a:ea typeface="Calibri" panose="020F0502020204030204" pitchFamily="34" charset="0"/>
@@ -5878,7 +6131,7 @@
                         </a:rPr>
                         <a:t>-5.262878</a:t>
                       </a:r>
-                      <a:endParaRPr lang="en-CA" sz="1100">
+                      <a:endParaRPr lang="en-CA" sz="1800">
                         <a:effectLst/>
                         <a:latin typeface="Calibri" panose="020F0502020204030204" pitchFamily="34" charset="0"/>
                         <a:ea typeface="Calibri" panose="020F0502020204030204" pitchFamily="34" charset="0"/>
@@ -5906,7 +6159,7 @@
                         </a:spcAft>
                       </a:pPr>
                       <a:r>
-                        <a:rPr lang="en-CA" sz="600">
+                        <a:rPr lang="en-CA" sz="1800">
                           <a:effectLst/>
                           <a:latin typeface="Segoe UI" panose="020B0502040204020203" pitchFamily="34" charset="0"/>
                           <a:ea typeface="Calibri" panose="020F0502020204030204" pitchFamily="34" charset="0"/>
@@ -5914,7 +6167,7 @@
                         </a:rPr>
                         <a:t>-1.381693</a:t>
                       </a:r>
-                      <a:endParaRPr lang="en-CA" sz="1100">
+                      <a:endParaRPr lang="en-CA" sz="1800">
                         <a:effectLst/>
                         <a:latin typeface="Calibri" panose="020F0502020204030204" pitchFamily="34" charset="0"/>
                         <a:ea typeface="Calibri" panose="020F0502020204030204" pitchFamily="34" charset="0"/>
@@ -5942,7 +6195,7 @@
                         </a:spcAft>
                       </a:pPr>
                       <a:r>
-                        <a:rPr lang="en-CA" sz="600" dirty="0">
+                        <a:rPr lang="en-CA" sz="1800" dirty="0">
                           <a:effectLst/>
                           <a:latin typeface="Segoe UI" panose="020B0502040204020203" pitchFamily="34" charset="0"/>
                           <a:ea typeface="Calibri" panose="020F0502020204030204" pitchFamily="34" charset="0"/>
@@ -5950,7 +6203,7 @@
                         </a:rPr>
                         <a:t>46.206537</a:t>
                       </a:r>
-                      <a:endParaRPr lang="en-CA" sz="1100" dirty="0">
+                      <a:endParaRPr lang="en-CA" sz="1800" dirty="0">
                         <a:effectLst/>
                         <a:latin typeface="Calibri" panose="020F0502020204030204" pitchFamily="34" charset="0"/>
                         <a:ea typeface="Calibri" panose="020F0502020204030204" pitchFamily="34" charset="0"/>
@@ -5989,7 +6242,7 @@
         <p:spPr>
           <a:xfrm>
             <a:off x="186620" y="186620"/>
-            <a:ext cx="8472196" cy="369332"/>
+            <a:ext cx="8472196" cy="646331"/>
           </a:xfrm>
           <a:prstGeom prst="rect">
             <a:avLst/>
@@ -6009,7 +6262,25 @@
                 <a:ea typeface="Calibri" panose="020F0502020204030204" pitchFamily="34" charset="0"/>
                 <a:cs typeface="Times New Roman" panose="02020603050405020304" pitchFamily="18" charset="0"/>
               </a:rPr>
-              <a:t>Data frame about Rate of Return for all of our Stock Indexes. </a:t>
+              <a:t>We then created a </a:t>
+            </a:r>
+            <a:r>
+              <a:rPr lang="en-CA" sz="1800" dirty="0" err="1">
+                <a:effectLst/>
+                <a:latin typeface="Calibri" panose="020F0502020204030204" pitchFamily="34" charset="0"/>
+                <a:ea typeface="Calibri" panose="020F0502020204030204" pitchFamily="34" charset="0"/>
+                <a:cs typeface="Times New Roman" panose="02020603050405020304" pitchFamily="18" charset="0"/>
+              </a:rPr>
+              <a:t>Dataframe</a:t>
+            </a:r>
+            <a:r>
+              <a:rPr lang="en-CA" sz="1800" dirty="0">
+                <a:effectLst/>
+                <a:latin typeface="Calibri" panose="020F0502020204030204" pitchFamily="34" charset="0"/>
+                <a:ea typeface="Calibri" panose="020F0502020204030204" pitchFamily="34" charset="0"/>
+                <a:cs typeface="Times New Roman" panose="02020603050405020304" pitchFamily="18" charset="0"/>
+              </a:rPr>
+              <a:t> to show the  Rate of Return for all of our Stock Indexes over 10, 5, 3, 1 Years: </a:t>
             </a:r>
             <a:endParaRPr lang="en-CA" dirty="0"/>
           </a:p>
@@ -6045,146 +6316,6 @@
           <a:chExt cx="0" cy="0"/>
         </a:xfrm>
       </p:grpSpPr>
-      <p:pic>
-        <p:nvPicPr>
-          <p:cNvPr id="4" name="Picture 3">
-            <a:extLst>
-              <a:ext uri="{FF2B5EF4-FFF2-40B4-BE49-F238E27FC236}">
-                <a16:creationId xmlns:a16="http://schemas.microsoft.com/office/drawing/2014/main" id="{9D377392-5BF4-1352-4CA1-3BFFA4ECA511}"/>
-              </a:ext>
-            </a:extLst>
-          </p:cNvPr>
-          <p:cNvPicPr>
-            <a:picLocks noChangeAspect="1"/>
-          </p:cNvPicPr>
-          <p:nvPr/>
-        </p:nvPicPr>
-        <p:blipFill>
-          <a:blip r:embed="rId2">
-            <a:extLst>
-              <a:ext uri="{28A0092B-C50C-407E-A947-70E740481C1C}">
-                <a14:useLocalDpi xmlns:a14="http://schemas.microsoft.com/office/drawing/2010/main" val="0"/>
-              </a:ext>
-            </a:extLst>
-          </a:blip>
-          <a:srcRect/>
-          <a:stretch/>
-        </p:blipFill>
-        <p:spPr>
-          <a:xfrm>
-            <a:off x="1552202" y="826976"/>
-            <a:ext cx="3579337" cy="2880000"/>
-          </a:xfrm>
-          <a:prstGeom prst="rect">
-            <a:avLst/>
-          </a:prstGeom>
-        </p:spPr>
-      </p:pic>
-      <p:pic>
-        <p:nvPicPr>
-          <p:cNvPr id="5" name="Picture 4">
-            <a:extLst>
-              <a:ext uri="{FF2B5EF4-FFF2-40B4-BE49-F238E27FC236}">
-                <a16:creationId xmlns:a16="http://schemas.microsoft.com/office/drawing/2014/main" id="{FA15DD09-D4F7-FFFC-7ABD-895CD3222860}"/>
-              </a:ext>
-            </a:extLst>
-          </p:cNvPr>
-          <p:cNvPicPr>
-            <a:picLocks noChangeAspect="1"/>
-          </p:cNvPicPr>
-          <p:nvPr/>
-        </p:nvPicPr>
-        <p:blipFill>
-          <a:blip r:embed="rId3">
-            <a:extLst>
-              <a:ext uri="{28A0092B-C50C-407E-A947-70E740481C1C}">
-                <a14:useLocalDpi xmlns:a14="http://schemas.microsoft.com/office/drawing/2010/main" val="0"/>
-              </a:ext>
-            </a:extLst>
-          </a:blip>
-          <a:srcRect/>
-          <a:stretch/>
-        </p:blipFill>
-        <p:spPr>
-          <a:xfrm>
-            <a:off x="6869511" y="826976"/>
-            <a:ext cx="3579337" cy="2880000"/>
-          </a:xfrm>
-          <a:prstGeom prst="rect">
-            <a:avLst/>
-          </a:prstGeom>
-        </p:spPr>
-      </p:pic>
-      <p:pic>
-        <p:nvPicPr>
-          <p:cNvPr id="6" name="Picture 5">
-            <a:extLst>
-              <a:ext uri="{FF2B5EF4-FFF2-40B4-BE49-F238E27FC236}">
-                <a16:creationId xmlns:a16="http://schemas.microsoft.com/office/drawing/2014/main" id="{31336A6F-E0C0-D81C-954D-19C350ABDFE1}"/>
-              </a:ext>
-            </a:extLst>
-          </p:cNvPr>
-          <p:cNvPicPr>
-            <a:picLocks noChangeAspect="1"/>
-          </p:cNvPicPr>
-          <p:nvPr/>
-        </p:nvPicPr>
-        <p:blipFill>
-          <a:blip r:embed="rId4">
-            <a:extLst>
-              <a:ext uri="{28A0092B-C50C-407E-A947-70E740481C1C}">
-                <a14:useLocalDpi xmlns:a14="http://schemas.microsoft.com/office/drawing/2010/main" val="0"/>
-              </a:ext>
-            </a:extLst>
-          </a:blip>
-          <a:srcRect/>
-          <a:stretch/>
-        </p:blipFill>
-        <p:spPr>
-          <a:xfrm>
-            <a:off x="1551793" y="3978000"/>
-            <a:ext cx="3579337" cy="2880000"/>
-          </a:xfrm>
-          <a:prstGeom prst="rect">
-            <a:avLst/>
-          </a:prstGeom>
-        </p:spPr>
-      </p:pic>
-      <p:pic>
-        <p:nvPicPr>
-          <p:cNvPr id="7" name="Picture 6">
-            <a:extLst>
-              <a:ext uri="{FF2B5EF4-FFF2-40B4-BE49-F238E27FC236}">
-                <a16:creationId xmlns:a16="http://schemas.microsoft.com/office/drawing/2014/main" id="{E317FD17-C46B-011D-75AF-F20A944D945D}"/>
-              </a:ext>
-            </a:extLst>
-          </p:cNvPr>
-          <p:cNvPicPr>
-            <a:picLocks noChangeAspect="1"/>
-          </p:cNvPicPr>
-          <p:nvPr/>
-        </p:nvPicPr>
-        <p:blipFill>
-          <a:blip r:embed="rId5">
-            <a:extLst>
-              <a:ext uri="{28A0092B-C50C-407E-A947-70E740481C1C}">
-                <a14:useLocalDpi xmlns:a14="http://schemas.microsoft.com/office/drawing/2010/main" val="0"/>
-              </a:ext>
-            </a:extLst>
-          </a:blip>
-          <a:srcRect/>
-          <a:stretch/>
-        </p:blipFill>
-        <p:spPr>
-          <a:xfrm>
-            <a:off x="6869147" y="3978000"/>
-            <a:ext cx="3579337" cy="2880000"/>
-          </a:xfrm>
-          <a:prstGeom prst="rect">
-            <a:avLst/>
-          </a:prstGeom>
-        </p:spPr>
-      </p:pic>
       <p:sp>
         <p:nvSpPr>
           <p:cNvPr id="8" name="TextBox 7">
@@ -6220,12 +6351,140 @@
                 <a:ea typeface="Calibri" panose="020F0502020204030204" pitchFamily="34" charset="0"/>
                 <a:cs typeface="Times New Roman" panose="02020603050405020304" pitchFamily="18" charset="0"/>
               </a:rPr>
-              <a:t>10, 5, 3 and 1 year Rate of Return for all of our Stock Indexes on Bar Chart. </a:t>
+              <a:t>We then graphed those results for 10, 5, 3 and 1 year Rate of Return for all of our Stock Indexes using a Bar Chart</a:t>
+            </a:r>
+            <a:r>
+              <a:rPr lang="en-CA" dirty="0">
+                <a:latin typeface="Calibri" panose="020F0502020204030204" pitchFamily="34" charset="0"/>
+                <a:ea typeface="Calibri" panose="020F0502020204030204" pitchFamily="34" charset="0"/>
+                <a:cs typeface="Times New Roman" panose="02020603050405020304" pitchFamily="18" charset="0"/>
+              </a:rPr>
+              <a:t>:</a:t>
             </a:r>
             <a:endParaRPr lang="en-CA" dirty="0"/>
           </a:p>
         </p:txBody>
       </p:sp>
+      <p:pic>
+        <p:nvPicPr>
+          <p:cNvPr id="3" name="Picture 2">
+            <a:extLst>
+              <a:ext uri="{FF2B5EF4-FFF2-40B4-BE49-F238E27FC236}">
+                <a16:creationId xmlns:a16="http://schemas.microsoft.com/office/drawing/2014/main" id="{C336B4ED-FDD9-8504-3B23-B1378A17EF82}"/>
+              </a:ext>
+            </a:extLst>
+          </p:cNvPr>
+          <p:cNvPicPr>
+            <a:picLocks noChangeAspect="1"/>
+          </p:cNvPicPr>
+          <p:nvPr/>
+        </p:nvPicPr>
+        <p:blipFill>
+          <a:blip r:embed="rId2"/>
+          <a:stretch>
+            <a:fillRect/>
+          </a:stretch>
+        </p:blipFill>
+        <p:spPr>
+          <a:xfrm>
+            <a:off x="1551793" y="555953"/>
+            <a:ext cx="4205198" cy="3151024"/>
+          </a:xfrm>
+          <a:prstGeom prst="rect">
+            <a:avLst/>
+          </a:prstGeom>
+        </p:spPr>
+      </p:pic>
+      <p:pic>
+        <p:nvPicPr>
+          <p:cNvPr id="10" name="Picture 9">
+            <a:extLst>
+              <a:ext uri="{FF2B5EF4-FFF2-40B4-BE49-F238E27FC236}">
+                <a16:creationId xmlns:a16="http://schemas.microsoft.com/office/drawing/2014/main" id="{121F9DC6-46E5-049A-B1A6-3A69D4B47820}"/>
+              </a:ext>
+            </a:extLst>
+          </p:cNvPr>
+          <p:cNvPicPr>
+            <a:picLocks noChangeAspect="1"/>
+          </p:cNvPicPr>
+          <p:nvPr/>
+        </p:nvPicPr>
+        <p:blipFill>
+          <a:blip r:embed="rId3"/>
+          <a:stretch>
+            <a:fillRect/>
+          </a:stretch>
+        </p:blipFill>
+        <p:spPr>
+          <a:xfrm>
+            <a:off x="1551793" y="3706977"/>
+            <a:ext cx="4204800" cy="3151023"/>
+          </a:xfrm>
+          <a:prstGeom prst="rect">
+            <a:avLst/>
+          </a:prstGeom>
+        </p:spPr>
+      </p:pic>
+      <p:pic>
+        <p:nvPicPr>
+          <p:cNvPr id="12" name="Picture 11">
+            <a:extLst>
+              <a:ext uri="{FF2B5EF4-FFF2-40B4-BE49-F238E27FC236}">
+                <a16:creationId xmlns:a16="http://schemas.microsoft.com/office/drawing/2014/main" id="{91983CAE-42C4-1B36-0B9E-96E1F05C7A0B}"/>
+              </a:ext>
+            </a:extLst>
+          </p:cNvPr>
+          <p:cNvPicPr>
+            <a:picLocks noChangeAspect="1"/>
+          </p:cNvPicPr>
+          <p:nvPr/>
+        </p:nvPicPr>
+        <p:blipFill>
+          <a:blip r:embed="rId4"/>
+          <a:stretch>
+            <a:fillRect/>
+          </a:stretch>
+        </p:blipFill>
+        <p:spPr>
+          <a:xfrm>
+            <a:off x="6461328" y="3706977"/>
+            <a:ext cx="4204800" cy="3151023"/>
+          </a:xfrm>
+          <a:prstGeom prst="rect">
+            <a:avLst/>
+          </a:prstGeom>
+        </p:spPr>
+      </p:pic>
+      <p:pic>
+        <p:nvPicPr>
+          <p:cNvPr id="14" name="Picture 13">
+            <a:extLst>
+              <a:ext uri="{FF2B5EF4-FFF2-40B4-BE49-F238E27FC236}">
+                <a16:creationId xmlns:a16="http://schemas.microsoft.com/office/drawing/2014/main" id="{FEF1F348-A593-8318-7BA3-A006D03093AC}"/>
+              </a:ext>
+            </a:extLst>
+          </p:cNvPr>
+          <p:cNvPicPr>
+            <a:picLocks noChangeAspect="1"/>
+          </p:cNvPicPr>
+          <p:nvPr/>
+        </p:nvPicPr>
+        <p:blipFill>
+          <a:blip r:embed="rId5"/>
+          <a:stretch>
+            <a:fillRect/>
+          </a:stretch>
+        </p:blipFill>
+        <p:spPr>
+          <a:xfrm>
+            <a:off x="6435010" y="555953"/>
+            <a:ext cx="4204800" cy="3151024"/>
+          </a:xfrm>
+          <a:prstGeom prst="rect">
+            <a:avLst/>
+          </a:prstGeom>
+        </p:spPr>
+      </p:pic>
     </p:spTree>
     <p:extLst>
       <p:ext uri="{BB962C8B-B14F-4D97-AF65-F5344CB8AC3E}">
@@ -6283,8 +6542,8 @@
         </p:blipFill>
         <p:spPr>
           <a:xfrm>
-            <a:off x="2221060" y="1629000"/>
-            <a:ext cx="7749880" cy="3600000"/>
+            <a:off x="775252" y="1133061"/>
+            <a:ext cx="10800000" cy="5235592"/>
           </a:xfrm>
           <a:prstGeom prst="rect">
             <a:avLst/>
@@ -6326,7 +6585,7 @@
                 <a:ea typeface="Calibri" panose="020F0502020204030204" pitchFamily="34" charset="0"/>
                 <a:cs typeface="Times New Roman" panose="02020603050405020304" pitchFamily="18" charset="0"/>
               </a:rPr>
-              <a:t>Top 10 Industries by Market Cap.</a:t>
+              <a:t>Top 10 Industries by Market Cap:</a:t>
             </a:r>
             <a:endParaRPr lang="en-CA" dirty="0"/>
           </a:p>
@@ -6389,8 +6648,8 @@
         </p:blipFill>
         <p:spPr>
           <a:xfrm>
-            <a:off x="2500338" y="1629000"/>
-            <a:ext cx="7191325" cy="3600000"/>
+            <a:off x="696000" y="943200"/>
+            <a:ext cx="10800000" cy="5268757"/>
           </a:xfrm>
           <a:prstGeom prst="rect">
             <a:avLst/>
@@ -6432,7 +6691,7 @@
                 <a:ea typeface="Calibri" panose="020F0502020204030204" pitchFamily="34" charset="0"/>
                 <a:cs typeface="Times New Roman" panose="02020603050405020304" pitchFamily="18" charset="0"/>
               </a:rPr>
-              <a:t>Top 10 Sectors by Market Cap.</a:t>
+              <a:t>Top 10 Sectors by Market Cap:</a:t>
             </a:r>
             <a:endParaRPr lang="en-CA" dirty="0"/>
           </a:p>
@@ -6495,8 +6754,8 @@
         </p:blipFill>
         <p:spPr>
           <a:xfrm>
-            <a:off x="3744114" y="729000"/>
-            <a:ext cx="4703773" cy="5400000"/>
+            <a:off x="2149087" y="1098331"/>
+            <a:ext cx="7275442" cy="5372043"/>
           </a:xfrm>
           <a:prstGeom prst="rect">
             <a:avLst/>
@@ -6517,7 +6776,7 @@
         </p:nvSpPr>
         <p:spPr>
           <a:xfrm>
-            <a:off x="186619" y="186620"/>
+            <a:off x="216436" y="186621"/>
             <a:ext cx="11140744" cy="369332"/>
           </a:xfrm>
           <a:prstGeom prst="rect">
@@ -6538,7 +6797,7 @@
                 <a:ea typeface="Calibri" panose="020F0502020204030204" pitchFamily="34" charset="0"/>
                 <a:cs typeface="Times New Roman" panose="02020603050405020304" pitchFamily="18" charset="0"/>
               </a:rPr>
-              <a:t>Mean dividend yield by sector</a:t>
+              <a:t>Mean dividend yield by sector:</a:t>
             </a:r>
             <a:endParaRPr lang="en-CA" dirty="0"/>
           </a:p>

</xml_diff>

<commit_message>
finishing presentation and adding PDF
</commit_message>
<xml_diff>
--- a/Presentation.pptx
+++ b/Presentation.pptx
@@ -3355,116 +3355,66 @@
           <a:chExt cx="0" cy="0"/>
         </a:xfrm>
       </p:grpSpPr>
-      <p:sp>
-        <p:nvSpPr>
-          <p:cNvPr id="2" name="Title 1">
-            <a:extLst>
-              <a:ext uri="{FF2B5EF4-FFF2-40B4-BE49-F238E27FC236}">
-                <a16:creationId xmlns:a16="http://schemas.microsoft.com/office/drawing/2014/main" id="{3B103533-47DE-F873-21FB-BE4AE6285420}"/>
-              </a:ext>
-            </a:extLst>
-          </p:cNvPr>
-          <p:cNvSpPr>
-            <a:spLocks noGrp="1"/>
-          </p:cNvSpPr>
-          <p:nvPr>
-            <p:ph type="title"/>
-          </p:nvPr>
-        </p:nvSpPr>
-        <p:spPr/>
-        <p:txBody>
-          <a:bodyPr>
-            <a:normAutofit fontScale="90000"/>
-          </a:bodyPr>
-          <a:lstStyle/>
-          <a:p>
-            <a:pPr algn="ctr"/>
-            <a:r>
-              <a:rPr lang="en-CA"/>
-              <a:t>Stock Market Questions about a 10 Year Period from </a:t>
-            </a:r>
-            <a:r>
-              <a:rPr lang="en-CA" b="0">
-                <a:effectLst/>
-              </a:rPr>
-              <a:t>2012-01-01 to 2022-01-01.</a:t>
-            </a:r>
-            <a:br>
-              <a:rPr lang="en-CA" b="0">
-                <a:solidFill>
-                  <a:srgbClr val="D4D4D4"/>
-                </a:solidFill>
-                <a:effectLst/>
-                <a:latin typeface="Consolas" panose="020B0609020204030204" pitchFamily="49" charset="0"/>
-              </a:rPr>
-            </a:br>
-            <a:endParaRPr lang="en-CA" dirty="0"/>
-          </a:p>
-        </p:txBody>
-      </p:sp>
-      <p:sp>
-        <p:nvSpPr>
-          <p:cNvPr id="4" name="Rectangle 1">
-            <a:extLst>
-              <a:ext uri="{FF2B5EF4-FFF2-40B4-BE49-F238E27FC236}">
-                <a16:creationId xmlns:a16="http://schemas.microsoft.com/office/drawing/2014/main" id="{E376FD14-7DCA-5A73-DCA5-14540BE4B8CA}"/>
-              </a:ext>
-            </a:extLst>
-          </p:cNvPr>
-          <p:cNvSpPr>
-            <a:spLocks noGrp="1" noChangeArrowheads="1"/>
-          </p:cNvSpPr>
-          <p:nvPr>
-            <p:ph idx="1"/>
-          </p:nvPr>
-        </p:nvSpPr>
-        <p:spPr bwMode="auto">
+      <p:pic>
+        <p:nvPicPr>
+          <p:cNvPr id="8" name="Picture 7" descr="Text, whiteboard&#10;&#10;Description automatically generated">
+            <a:extLst>
+              <a:ext uri="{FF2B5EF4-FFF2-40B4-BE49-F238E27FC236}">
+                <a16:creationId xmlns:a16="http://schemas.microsoft.com/office/drawing/2014/main" id="{849C7DF6-ED80-69C0-0BDF-895E38176381}"/>
+              </a:ext>
+            </a:extLst>
+          </p:cNvPr>
+          <p:cNvPicPr>
+            <a:picLocks noChangeAspect="1"/>
+          </p:cNvPicPr>
+          <p:nvPr/>
+        </p:nvPicPr>
+        <p:blipFill>
+          <a:blip r:embed="rId2">
+            <a:extLst>
+              <a:ext uri="{28A0092B-C50C-407E-A947-70E740481C1C}">
+                <a14:useLocalDpi xmlns:a14="http://schemas.microsoft.com/office/drawing/2010/main" val="0"/>
+              </a:ext>
+            </a:extLst>
+          </a:blip>
+          <a:stretch>
+            <a:fillRect/>
+          </a:stretch>
+        </p:blipFill>
+        <p:spPr>
           <a:xfrm>
-            <a:off x="6003634" y="3739684"/>
-            <a:ext cx="184731" cy="523220"/>
+            <a:off x="0" y="0"/>
+            <a:ext cx="12192000" cy="6858000"/>
+          </a:xfrm>
+          <a:prstGeom prst="rect">
+            <a:avLst/>
+          </a:prstGeom>
+        </p:spPr>
+      </p:pic>
+      <p:sp>
+        <p:nvSpPr>
+          <p:cNvPr id="6" name="TextBox 5">
+            <a:extLst>
+              <a:ext uri="{FF2B5EF4-FFF2-40B4-BE49-F238E27FC236}">
+                <a16:creationId xmlns:a16="http://schemas.microsoft.com/office/drawing/2014/main" id="{994A3CE5-C5E6-B856-49B5-890E12344C4C}"/>
+              </a:ext>
+            </a:extLst>
+          </p:cNvPr>
+          <p:cNvSpPr txBox="1"/>
+          <p:nvPr/>
+        </p:nvSpPr>
+        <p:spPr>
+          <a:xfrm>
+            <a:off x="2870799" y="2187029"/>
+            <a:ext cx="6450401" cy="523220"/>
           </a:xfrm>
           <a:prstGeom prst="rect">
             <a:avLst/>
           </a:prstGeom>
           <a:noFill/>
-          <a:ln>
-            <a:noFill/>
-          </a:ln>
-          <a:effectLst/>
-          <a:extLst>
-            <a:ext uri="{909E8E84-426E-40DD-AFC4-6F175D3DCCD1}">
-              <a14:hiddenFill xmlns:a14="http://schemas.microsoft.com/office/drawing/2010/main">
-                <a:solidFill>
-                  <a:schemeClr val="accent1"/>
-                </a:solidFill>
-              </a14:hiddenFill>
-            </a:ext>
-            <a:ext uri="{91240B29-F687-4F45-9708-019B960494DF}">
-              <a14:hiddenLine xmlns:a14="http://schemas.microsoft.com/office/drawing/2010/main" w="9525">
-                <a:solidFill>
-                  <a:schemeClr val="tx1"/>
-                </a:solidFill>
-                <a:miter lim="800000"/>
-                <a:headEnd/>
-                <a:tailEnd/>
-              </a14:hiddenLine>
-            </a:ext>
-            <a:ext uri="{AF507438-7753-43E0-B8FC-AC1667EBCBE1}">
-              <a14:hiddenEffects xmlns:a14="http://schemas.microsoft.com/office/drawing/2010/main">
-                <a:effectLst>
-                  <a:outerShdw dist="35921" dir="2700000" algn="ctr" rotWithShape="0">
-                    <a:schemeClr val="bg2"/>
-                  </a:outerShdw>
-                </a:effectLst>
-              </a14:hiddenEffects>
-            </a:ext>
-          </a:extLst>
         </p:spPr>
         <p:txBody>
-          <a:bodyPr vert="horz" wrap="none" lIns="91440" tIns="45720" rIns="91440" bIns="45720" numCol="1" anchor="ctr" anchorCtr="0" compatLnSpc="1">
-            <a:prstTxWarp prst="textNoShape">
-              <a:avLst/>
-            </a:prstTxWarp>
+          <a:bodyPr wrap="square">
             <a:spAutoFit/>
           </a:bodyPr>
           <a:lstStyle/>
@@ -3485,65 +3435,8 @@
               <a:buNone/>
               <a:tabLst/>
             </a:pPr>
-            <a:endParaRPr kumimoji="0" lang="en-US" altLang="en-US" b="0" i="0" u="none" strike="noStrike" cap="none" normalizeH="0" baseline="0" dirty="0">
-              <a:ln>
-                <a:noFill/>
-              </a:ln>
-              <a:solidFill>
-                <a:schemeClr val="tx1"/>
-              </a:solidFill>
-              <a:effectLst/>
-              <a:latin typeface="Arial" panose="020B0604020202020204" pitchFamily="34" charset="0"/>
-            </a:endParaRPr>
-          </a:p>
-        </p:txBody>
-      </p:sp>
-      <p:sp>
-        <p:nvSpPr>
-          <p:cNvPr id="6" name="TextBox 5">
-            <a:extLst>
-              <a:ext uri="{FF2B5EF4-FFF2-40B4-BE49-F238E27FC236}">
-                <a16:creationId xmlns:a16="http://schemas.microsoft.com/office/drawing/2014/main" id="{994A3CE5-C5E6-B856-49B5-890E12344C4C}"/>
-              </a:ext>
-            </a:extLst>
-          </p:cNvPr>
-          <p:cNvSpPr txBox="1"/>
-          <p:nvPr/>
-        </p:nvSpPr>
-        <p:spPr>
-          <a:xfrm>
-            <a:off x="2691442" y="1321356"/>
-            <a:ext cx="6450401" cy="523220"/>
-          </a:xfrm>
-          <a:prstGeom prst="rect">
-            <a:avLst/>
-          </a:prstGeom>
-          <a:noFill/>
-        </p:spPr>
-        <p:txBody>
-          <a:bodyPr wrap="square">
-            <a:spAutoFit/>
-          </a:bodyPr>
-          <a:lstStyle/>
-          <a:p>
-            <a:pPr marL="0" marR="0" lvl="0" indent="0" algn="ctr" defTabSz="914400" rtl="0" eaLnBrk="0" fontAlgn="base" latinLnBrk="0" hangingPunct="0">
-              <a:lnSpc>
-                <a:spcPct val="100000"/>
-              </a:lnSpc>
-              <a:spcBef>
-                <a:spcPct val="0"/>
-              </a:spcBef>
-              <a:spcAft>
-                <a:spcPct val="0"/>
-              </a:spcAft>
-              <a:buClrTx/>
-              <a:buSzTx/>
-              <a:buFontTx/>
-              <a:buNone/>
-              <a:tabLst/>
-            </a:pPr>
-            <a:r>
-              <a:rPr kumimoji="0" lang="en-US" altLang="en-US" sz="2800" b="0" i="0" u="none" strike="noStrike" cap="none" normalizeH="0" baseline="0">
+            <a:r>
+              <a:rPr kumimoji="0" lang="en-US" altLang="en-US" sz="2800" b="0" i="0" u="none" strike="noStrike" cap="none" normalizeH="0" baseline="0" dirty="0">
                 <a:ln>
                   <a:noFill/>
                 </a:ln>
@@ -3586,6 +3479,14 @@
 <file path=ppt/slides/slide2.xml><?xml version="1.0" encoding="utf-8"?>
 <p:sld xmlns:a="http://schemas.openxmlformats.org/drawingml/2006/main" xmlns:r="http://schemas.openxmlformats.org/officeDocument/2006/relationships" xmlns:p="http://schemas.openxmlformats.org/presentationml/2006/main">
   <p:cSld>
+    <p:bg>
+      <p:bgPr>
+        <a:solidFill>
+          <a:srgbClr val="FDF6EC"/>
+        </a:solidFill>
+        <a:effectLst/>
+      </p:bgPr>
+    </p:bg>
     <p:spTree>
       <p:nvGrpSpPr>
         <p:cNvPr id="1" name=""/>
@@ -3952,6 +3853,14 @@
 <file path=ppt/slides/slide3.xml><?xml version="1.0" encoding="utf-8"?>
 <p:sld xmlns:a="http://schemas.openxmlformats.org/drawingml/2006/main" xmlns:r="http://schemas.openxmlformats.org/officeDocument/2006/relationships" xmlns:p="http://schemas.openxmlformats.org/presentationml/2006/main">
   <p:cSld>
+    <p:bg>
+      <p:bgPr>
+        <a:solidFill>
+          <a:srgbClr val="FDF6EC"/>
+        </a:solidFill>
+        <a:effectLst/>
+      </p:bgPr>
+    </p:bg>
     <p:spTree>
       <p:nvGrpSpPr>
         <p:cNvPr id="1" name=""/>
@@ -4053,6 +3962,14 @@
 <file path=ppt/slides/slide4.xml><?xml version="1.0" encoding="utf-8"?>
 <p:sld xmlns:a="http://schemas.openxmlformats.org/drawingml/2006/main" xmlns:r="http://schemas.openxmlformats.org/officeDocument/2006/relationships" xmlns:p="http://schemas.openxmlformats.org/presentationml/2006/main">
   <p:cSld>
+    <p:bg>
+      <p:bgPr>
+        <a:solidFill>
+          <a:srgbClr val="FDF6EC"/>
+        </a:solidFill>
+        <a:effectLst/>
+      </p:bgPr>
+    </p:bg>
     <p:spTree>
       <p:nvGrpSpPr>
         <p:cNvPr id="1" name=""/>
@@ -6446,6 +6363,14 @@
 <file path=ppt/slides/slide5.xml><?xml version="1.0" encoding="utf-8"?>
 <p:sld xmlns:a="http://schemas.openxmlformats.org/drawingml/2006/main" xmlns:r="http://schemas.openxmlformats.org/officeDocument/2006/relationships" xmlns:p="http://schemas.openxmlformats.org/presentationml/2006/main">
   <p:cSld>
+    <p:bg>
+      <p:bgPr>
+        <a:solidFill>
+          <a:srgbClr val="FDF6EC"/>
+        </a:solidFill>
+        <a:effectLst/>
+      </p:bgPr>
+    </p:bg>
     <p:spTree>
       <p:nvGrpSpPr>
         <p:cNvPr id="1" name=""/>
@@ -6645,6 +6570,14 @@
 <file path=ppt/slides/slide6.xml><?xml version="1.0" encoding="utf-8"?>
 <p:sld xmlns:a="http://schemas.openxmlformats.org/drawingml/2006/main" xmlns:r="http://schemas.openxmlformats.org/officeDocument/2006/relationships" xmlns:p="http://schemas.openxmlformats.org/presentationml/2006/main">
   <p:cSld>
+    <p:bg>
+      <p:bgPr>
+        <a:solidFill>
+          <a:srgbClr val="FDF6EC"/>
+        </a:solidFill>
+        <a:effectLst/>
+      </p:bgPr>
+    </p:bg>
     <p:spTree>
       <p:nvGrpSpPr>
         <p:cNvPr id="1" name=""/>
@@ -6751,6 +6684,14 @@
 <file path=ppt/slides/slide7.xml><?xml version="1.0" encoding="utf-8"?>
 <p:sld xmlns:a="http://schemas.openxmlformats.org/drawingml/2006/main" xmlns:r="http://schemas.openxmlformats.org/officeDocument/2006/relationships" xmlns:p="http://schemas.openxmlformats.org/presentationml/2006/main">
   <p:cSld>
+    <p:bg>
+      <p:bgPr>
+        <a:solidFill>
+          <a:srgbClr val="FDF6EC"/>
+        </a:solidFill>
+        <a:effectLst/>
+      </p:bgPr>
+    </p:bg>
     <p:spTree>
       <p:nvGrpSpPr>
         <p:cNvPr id="1" name=""/>
@@ -6857,6 +6798,14 @@
 <file path=ppt/slides/slide8.xml><?xml version="1.0" encoding="utf-8"?>
 <p:sld xmlns:a="http://schemas.openxmlformats.org/drawingml/2006/main" xmlns:r="http://schemas.openxmlformats.org/officeDocument/2006/relationships" xmlns:p="http://schemas.openxmlformats.org/presentationml/2006/main">
   <p:cSld>
+    <p:bg>
+      <p:bgPr>
+        <a:solidFill>
+          <a:srgbClr val="FDF6EC"/>
+        </a:solidFill>
+        <a:effectLst/>
+      </p:bgPr>
+    </p:bg>
     <p:spTree>
       <p:nvGrpSpPr>
         <p:cNvPr id="1" name=""/>
@@ -6980,6 +6929,14 @@
 <file path=ppt/slides/slide9.xml><?xml version="1.0" encoding="utf-8"?>
 <p:sld xmlns:a="http://schemas.openxmlformats.org/drawingml/2006/main" xmlns:r="http://schemas.openxmlformats.org/officeDocument/2006/relationships" xmlns:p="http://schemas.openxmlformats.org/presentationml/2006/main">
   <p:cSld>
+    <p:bg>
+      <p:bgPr>
+        <a:solidFill>
+          <a:srgbClr val="FDF6EC"/>
+        </a:solidFill>
+        <a:effectLst/>
+      </p:bgPr>
+    </p:bg>
     <p:spTree>
       <p:nvGrpSpPr>
         <p:cNvPr id="1" name=""/>
@@ -7010,40 +6967,22 @@
             <p:ph type="title"/>
           </p:nvPr>
         </p:nvSpPr>
-        <p:spPr/>
-        <p:txBody>
-          <a:bodyPr/>
+        <p:spPr>
+          <a:xfrm>
+            <a:off x="734290" y="2766218"/>
+            <a:ext cx="10723419" cy="1325563"/>
+          </a:xfrm>
+        </p:spPr>
+        <p:txBody>
+          <a:bodyPr>
+            <a:normAutofit/>
+          </a:bodyPr>
           <a:lstStyle/>
           <a:p>
             <a:r>
-              <a:rPr lang="en-CA" dirty="0"/>
+              <a:rPr lang="en-CA" sz="6000" dirty="0"/>
               <a:t>Project Learnings and Questions?</a:t>
             </a:r>
-          </a:p>
-        </p:txBody>
-      </p:sp>
-      <p:sp>
-        <p:nvSpPr>
-          <p:cNvPr id="3" name="Content Placeholder 2">
-            <a:extLst>
-              <a:ext uri="{FF2B5EF4-FFF2-40B4-BE49-F238E27FC236}">
-                <a16:creationId xmlns:a16="http://schemas.microsoft.com/office/drawing/2014/main" id="{B1541F70-DD61-8C7C-AA1E-D35E1DAB7C97}"/>
-              </a:ext>
-            </a:extLst>
-          </p:cNvPr>
-          <p:cNvSpPr>
-            <a:spLocks noGrp="1"/>
-          </p:cNvSpPr>
-          <p:nvPr>
-            <p:ph idx="1"/>
-          </p:nvPr>
-        </p:nvSpPr>
-        <p:spPr/>
-        <p:txBody>
-          <a:bodyPr/>
-          <a:lstStyle/>
-          <a:p>
-            <a:endParaRPr lang="en-CA"/>
           </a:p>
         </p:txBody>
       </p:sp>

</xml_diff>